<commit_message>
Project report and ppts are added
- utility file added to understand multiple utility functions( ex - progress bar is added )
- Project - Readme is updated
- RL reference books are added
- project code - after rerun some minor changes are added like visualization graph
</commit_message>
<xml_diff>
--- a/Applied-Machine-Learning/Capstone Project/DenguePrediction_Capstone_Presentation_Febil_Chacko__29_07_2019.pptx
+++ b/Applied-Machine-Learning/Capstone Project/DenguePrediction_Capstone_Presentation_Febil_Chacko__29_07_2019.pptx
@@ -5,7 +5,7 @@
     <p:sldMasterId id="2147483960" r:id="rId1"/>
   </p:sldMasterIdLst>
   <p:notesMasterIdLst>
-    <p:notesMasterId r:id="rId9"/>
+    <p:notesMasterId r:id="rId10"/>
   </p:notesMasterIdLst>
   <p:sldIdLst>
     <p:sldId id="256" r:id="rId2"/>
@@ -15,6 +15,7 @@
     <p:sldId id="340" r:id="rId6"/>
     <p:sldId id="341" r:id="rId7"/>
     <p:sldId id="318" r:id="rId8"/>
+    <p:sldId id="342" r:id="rId9"/>
   </p:sldIdLst>
   <p:sldSz cx="12192000" cy="6858000"/>
   <p:notesSz cx="6858000" cy="9144000"/>
@@ -115,7 +116,7 @@
   </p:defaultTextStyle>
   <p:extLst>
     <p:ext uri="{521415D9-36F7-43E2-AB2F-B90AF26B5E84}">
-      <p14:sectionLst xmlns:p14="http://schemas.microsoft.com/office/powerpoint/2010/main" xmlns="">
+      <p14:sectionLst xmlns="" xmlns:p14="http://schemas.microsoft.com/office/powerpoint/2010/main">
         <p14:section name="Default Section" id="{EABBB916-05FF-5141-A38D-A1FA34BDF6E2}">
           <p14:sldIdLst>
             <p14:sldId id="256"/>
@@ -144,7 +145,7 @@
       </p14:sectionLst>
     </p:ext>
     <p:ext uri="{EFAFB233-063F-42B5-8137-9DF3F51BA10A}">
-      <p15:sldGuideLst xmlns:p15="http://schemas.microsoft.com/office/powerpoint/2012/main" xmlns=""/>
+      <p15:sldGuideLst xmlns="" xmlns:p15="http://schemas.microsoft.com/office/powerpoint/2012/main"/>
     </p:ext>
   </p:extLst>
 </p:presentation>
@@ -155,7 +156,7 @@
   <p:cmAuthor id="1" name="Pramod Paul" initials="PP" lastIdx="1" clrIdx="0">
     <p:extLst>
       <p:ext uri="{19B8F6BF-5375-455C-9EA6-DF929625EA0E}">
-        <p15:presenceInfo xmlns:p15="http://schemas.microsoft.com/office/powerpoint/2012/main" xmlns="" userId="0c8af3b5b27ccd0a" providerId="Windows Live"/>
+        <p15:presenceInfo xmlns="" xmlns:p15="http://schemas.microsoft.com/office/powerpoint/2012/main" userId="0c8af3b5b27ccd0a" providerId="Windows Live"/>
       </p:ext>
     </p:extLst>
   </p:cmAuthor>
@@ -924,17 +925,42 @@
       </dgm:t>
     </dgm:pt>
     <dgm:pt modelId="{34F39992-FA21-4492-BF69-0EDCF883FFA5}">
-      <dgm:prSet/>
+      <dgm:prSet>
+        <dgm:style>
+          <a:lnRef idx="2">
+            <a:schemeClr val="accent1">
+              <a:shade val="50000"/>
+            </a:schemeClr>
+          </a:lnRef>
+          <a:fillRef idx="1">
+            <a:schemeClr val="accent1"/>
+          </a:fillRef>
+          <a:effectRef idx="0">
+            <a:schemeClr val="accent1"/>
+          </a:effectRef>
+          <a:fontRef idx="minor">
+            <a:schemeClr val="lt1"/>
+          </a:fontRef>
+        </dgm:style>
+      </dgm:prSet>
       <dgm:spPr/>
       <dgm:t>
         <a:bodyPr/>
         <a:lstStyle/>
         <a:p>
           <a:r>
-            <a:rPr lang="en-AU" dirty="0" smtClean="0"/>
+            <a:rPr lang="en-AU" dirty="0" smtClean="0">
+              <a:solidFill>
+                <a:srgbClr val="C00000"/>
+              </a:solidFill>
+            </a:rPr>
             <a:t> Data Exploration( data format, dimension,   missing values,  duplicate entries, descriptive analysis, correlation ... ) </a:t>
           </a:r>
-          <a:endParaRPr lang="en-US" dirty="0"/>
+          <a:endParaRPr lang="en-US" dirty="0">
+            <a:solidFill>
+              <a:srgbClr val="C00000"/>
+            </a:solidFill>
+          </a:endParaRPr>
         </a:p>
       </dgm:t>
     </dgm:pt>
@@ -961,17 +987,42 @@
       </dgm:t>
     </dgm:pt>
     <dgm:pt modelId="{B2ACA2FF-195A-4E65-AAFC-84C361CE5EB6}">
-      <dgm:prSet custT="1"/>
+      <dgm:prSet custT="1">
+        <dgm:style>
+          <a:lnRef idx="2">
+            <a:schemeClr val="accent1">
+              <a:shade val="50000"/>
+            </a:schemeClr>
+          </a:lnRef>
+          <a:fillRef idx="1">
+            <a:schemeClr val="accent1"/>
+          </a:fillRef>
+          <a:effectRef idx="0">
+            <a:schemeClr val="accent1"/>
+          </a:effectRef>
+          <a:fontRef idx="minor">
+            <a:schemeClr val="lt1"/>
+          </a:fontRef>
+        </dgm:style>
+      </dgm:prSet>
       <dgm:spPr/>
       <dgm:t>
         <a:bodyPr/>
         <a:lstStyle/>
         <a:p>
           <a:r>
-            <a:rPr lang="en-AU" sz="1700" smtClean="0"/>
+            <a:rPr lang="en-AU" sz="1700" dirty="0" smtClean="0">
+              <a:solidFill>
+                <a:srgbClr val="C00000"/>
+              </a:solidFill>
+            </a:rPr>
             <a:t>Data Visualization(  Target variable distribution, year wise, month wise, week wise  data distribution analysis)</a:t>
           </a:r>
-          <a:endParaRPr lang="en-AU" sz="1700" dirty="0"/>
+          <a:endParaRPr lang="en-AU" sz="1700" dirty="0">
+            <a:solidFill>
+              <a:srgbClr val="C00000"/>
+            </a:solidFill>
+          </a:endParaRPr>
         </a:p>
       </dgm:t>
     </dgm:pt>
@@ -998,17 +1049,42 @@
       </dgm:t>
     </dgm:pt>
     <dgm:pt modelId="{28DB6A8F-B208-45E8-AA41-F3327B84633E}">
-      <dgm:prSet/>
+      <dgm:prSet>
+        <dgm:style>
+          <a:lnRef idx="2">
+            <a:schemeClr val="accent1">
+              <a:shade val="50000"/>
+            </a:schemeClr>
+          </a:lnRef>
+          <a:fillRef idx="1">
+            <a:schemeClr val="accent1"/>
+          </a:fillRef>
+          <a:effectRef idx="0">
+            <a:schemeClr val="accent1"/>
+          </a:effectRef>
+          <a:fontRef idx="minor">
+            <a:schemeClr val="lt1"/>
+          </a:fontRef>
+        </dgm:style>
+      </dgm:prSet>
       <dgm:spPr/>
       <dgm:t>
         <a:bodyPr/>
         <a:lstStyle/>
         <a:p>
           <a:r>
-            <a:rPr lang="en-US" smtClean="0"/>
+            <a:rPr lang="en-US" dirty="0" smtClean="0">
+              <a:solidFill>
+                <a:srgbClr val="C00000"/>
+              </a:solidFill>
+            </a:rPr>
             <a:t>New Feature Exploration  ( Mean of vegetation , rolling lag window)</a:t>
           </a:r>
-          <a:endParaRPr lang="en-US" dirty="0"/>
+          <a:endParaRPr lang="en-US" dirty="0">
+            <a:solidFill>
+              <a:srgbClr val="C00000"/>
+            </a:solidFill>
+          </a:endParaRPr>
         </a:p>
       </dgm:t>
     </dgm:pt>
@@ -1035,7 +1111,24 @@
       </dgm:t>
     </dgm:pt>
     <dgm:pt modelId="{12FE8065-B538-4AF9-8AE9-05180E01028F}">
-      <dgm:prSet/>
+      <dgm:prSet>
+        <dgm:style>
+          <a:lnRef idx="2">
+            <a:schemeClr val="accent1">
+              <a:shade val="50000"/>
+            </a:schemeClr>
+          </a:lnRef>
+          <a:fillRef idx="1">
+            <a:schemeClr val="accent1"/>
+          </a:fillRef>
+          <a:effectRef idx="0">
+            <a:schemeClr val="accent1"/>
+          </a:effectRef>
+          <a:fontRef idx="minor">
+            <a:schemeClr val="lt1"/>
+          </a:fontRef>
+        </dgm:style>
+      </dgm:prSet>
       <dgm:spPr/>
       <dgm:t>
         <a:bodyPr/>
@@ -1043,10 +1136,18 @@
         <a:p>
           <a:pPr algn="l"/>
           <a:r>
-            <a:rPr lang="en-IN" dirty="0" smtClean="0"/>
+            <a:rPr lang="en-IN" dirty="0" smtClean="0">
+              <a:solidFill>
+                <a:srgbClr val="C00000"/>
+              </a:solidFill>
+            </a:rPr>
             <a:t>Separated the dataset for each city</a:t>
           </a:r>
-          <a:endParaRPr lang="en-US" dirty="0"/>
+          <a:endParaRPr lang="en-US" dirty="0">
+            <a:solidFill>
+              <a:srgbClr val="C00000"/>
+            </a:solidFill>
+          </a:endParaRPr>
         </a:p>
       </dgm:t>
     </dgm:pt>
@@ -1073,17 +1174,42 @@
       </dgm:t>
     </dgm:pt>
     <dgm:pt modelId="{FA8F47D9-39E5-497A-A5B7-3B0306D080B4}">
-      <dgm:prSet custT="1"/>
+      <dgm:prSet custT="1">
+        <dgm:style>
+          <a:lnRef idx="2">
+            <a:schemeClr val="accent1">
+              <a:shade val="50000"/>
+            </a:schemeClr>
+          </a:lnRef>
+          <a:fillRef idx="1">
+            <a:schemeClr val="accent1"/>
+          </a:fillRef>
+          <a:effectRef idx="0">
+            <a:schemeClr val="accent1"/>
+          </a:effectRef>
+          <a:fontRef idx="minor">
+            <a:schemeClr val="lt1"/>
+          </a:fontRef>
+        </dgm:style>
+      </dgm:prSet>
       <dgm:spPr/>
       <dgm:t>
         <a:bodyPr/>
         <a:lstStyle/>
         <a:p>
           <a:r>
-            <a:rPr lang="en-US" sz="1600" dirty="0" smtClean="0"/>
+            <a:rPr lang="en-US" sz="1600" dirty="0" smtClean="0">
+              <a:solidFill>
+                <a:srgbClr val="C00000"/>
+              </a:solidFill>
+            </a:rPr>
             <a:t>Filling Missing Entries ( interpolate ),                    Unit-Conversion</a:t>
           </a:r>
-          <a:endParaRPr lang="en-US" sz="1600" dirty="0"/>
+          <a:endParaRPr lang="en-US" sz="1600" dirty="0">
+            <a:solidFill>
+              <a:srgbClr val="C00000"/>
+            </a:solidFill>
+          </a:endParaRPr>
         </a:p>
       </dgm:t>
     </dgm:pt>
@@ -1351,26 +1477,26 @@
     </dgm:pt>
   </dgm:ptLst>
   <dgm:cxnLst>
+    <dgm:cxn modelId="{48DC9954-70FF-44AB-803D-75C2A67128A4}" type="presOf" srcId="{5F12878A-FD93-403F-933D-D7CB5F3E8A6D}" destId="{49DB2F62-C230-4480-9397-D4EA7FD0CA47}" srcOrd="0" destOrd="0" presId="urn:microsoft.com/office/officeart/2005/8/layout/vProcess5"/>
+    <dgm:cxn modelId="{ABBE9EB3-A818-43E3-9383-D012130587C8}" type="presOf" srcId="{B2ACA2FF-195A-4E65-AAFC-84C361CE5EB6}" destId="{C7F469B1-618C-4E2B-856D-FDA6F5535A3C}" srcOrd="0" destOrd="0" presId="urn:microsoft.com/office/officeart/2005/8/layout/vProcess5"/>
+    <dgm:cxn modelId="{30274B78-07EC-47C4-A9CF-1248B5F746BC}" type="presOf" srcId="{B2ACA2FF-195A-4E65-AAFC-84C361CE5EB6}" destId="{6F383434-44B9-4BDA-9E8B-ED508A1A5405}" srcOrd="1" destOrd="0" presId="urn:microsoft.com/office/officeart/2005/8/layout/vProcess5"/>
+    <dgm:cxn modelId="{60FA6890-357A-433C-89BC-57C58E3AC5F4}" srcId="{623F773F-579E-4C63-B94E-DF4087BEE8EA}" destId="{28DB6A8F-B208-45E8-AA41-F3327B84633E}" srcOrd="3" destOrd="0" parTransId="{D578B9E5-F658-421B-BCCA-8A0D1C06E979}" sibTransId="{5F12878A-FD93-403F-933D-D7CB5F3E8A6D}"/>
+    <dgm:cxn modelId="{A0BEDDDE-B9C5-4277-855F-2424205B9D1D}" type="presOf" srcId="{F5E8D9EE-AB4A-42C5-A999-C2707837A474}" destId="{D3A78DF3-2E52-4866-8F67-88584A429910}" srcOrd="0" destOrd="0" presId="urn:microsoft.com/office/officeart/2005/8/layout/vProcess5"/>
+    <dgm:cxn modelId="{6788945B-0F4C-4D98-B860-EA09DCE43159}" type="presOf" srcId="{34F39992-FA21-4492-BF69-0EDCF883FFA5}" destId="{63189335-FAAF-402E-8E6E-CFD5AE29E014}" srcOrd="0" destOrd="0" presId="urn:microsoft.com/office/officeart/2005/8/layout/vProcess5"/>
+    <dgm:cxn modelId="{465F210B-E524-4F05-B79A-A96506258EBB}" type="presOf" srcId="{02E82412-62FE-4CFD-976D-170251FC51D4}" destId="{79A7FC6B-B67B-4328-9A09-FCEE1AEEE30F}" srcOrd="0" destOrd="0" presId="urn:microsoft.com/office/officeart/2005/8/layout/vProcess5"/>
+    <dgm:cxn modelId="{E60779A6-6B59-48D2-82BF-5C1C313BD657}" type="presOf" srcId="{28DB6A8F-B208-45E8-AA41-F3327B84633E}" destId="{0C07DECC-3F0E-4AE1-A5BD-87AB46EE4141}" srcOrd="1" destOrd="0" presId="urn:microsoft.com/office/officeart/2005/8/layout/vProcess5"/>
+    <dgm:cxn modelId="{8C4225ED-9024-43B9-990A-FF1DD3495FBF}" srcId="{623F773F-579E-4C63-B94E-DF4087BEE8EA}" destId="{34F39992-FA21-4492-BF69-0EDCF883FFA5}" srcOrd="0" destOrd="0" parTransId="{23136E4E-EAAA-4164-8A68-8E0FE20CFCB4}" sibTransId="{F5E8D9EE-AB4A-42C5-A999-C2707837A474}"/>
     <dgm:cxn modelId="{7FF31E77-BED4-4A3D-8959-F2B7150BC2D3}" type="presOf" srcId="{FA8F47D9-39E5-497A-A5B7-3B0306D080B4}" destId="{DA441B69-7E9D-49E3-93DD-A887B0CC9C6C}" srcOrd="0" destOrd="0" presId="urn:microsoft.com/office/officeart/2005/8/layout/vProcess5"/>
+    <dgm:cxn modelId="{2FA4BC5F-5BEE-4DFF-8C4E-D4C06F6961A0}" type="presOf" srcId="{28DB6A8F-B208-45E8-AA41-F3327B84633E}" destId="{E722A8E2-BA3F-448E-883E-DA2C099F64AD}" srcOrd="0" destOrd="0" presId="urn:microsoft.com/office/officeart/2005/8/layout/vProcess5"/>
+    <dgm:cxn modelId="{93CB968D-8379-48C8-A382-0B9CD80255E4}" type="presOf" srcId="{AD723545-7471-4C27-8417-76395C799C16}" destId="{2B459D3A-475D-4C2E-BB22-7D16677A64F1}" srcOrd="0" destOrd="0" presId="urn:microsoft.com/office/officeart/2005/8/layout/vProcess5"/>
+    <dgm:cxn modelId="{2B7D6A7C-2511-40E9-87DC-20428B5A243B}" srcId="{623F773F-579E-4C63-B94E-DF4087BEE8EA}" destId="{FA8F47D9-39E5-497A-A5B7-3B0306D080B4}" srcOrd="1" destOrd="0" parTransId="{084DE055-159A-4562-BB9B-3F7808B62134}" sibTransId="{02E82412-62FE-4CFD-976D-170251FC51D4}"/>
+    <dgm:cxn modelId="{A281EF8D-5A1E-4A89-851E-2578C19A83A5}" type="presOf" srcId="{34F39992-FA21-4492-BF69-0EDCF883FFA5}" destId="{CDB0C44B-15F8-4EF4-9C6E-041E254F036E}" srcOrd="1" destOrd="0" presId="urn:microsoft.com/office/officeart/2005/8/layout/vProcess5"/>
+    <dgm:cxn modelId="{09FF9245-6220-421E-8E97-9DC4842E85AF}" type="presOf" srcId="{FA8F47D9-39E5-497A-A5B7-3B0306D080B4}" destId="{03A58761-99AC-40E3-9DF5-E9C9E487FA44}" srcOrd="1" destOrd="0" presId="urn:microsoft.com/office/officeart/2005/8/layout/vProcess5"/>
+    <dgm:cxn modelId="{F7B77232-6FDB-4639-B7D5-90DB95D450F6}" type="presOf" srcId="{623F773F-579E-4C63-B94E-DF4087BEE8EA}" destId="{EFF79F8C-4480-1C4D-83BA-FC272F236144}" srcOrd="0" destOrd="0" presId="urn:microsoft.com/office/officeart/2005/8/layout/vProcess5"/>
+    <dgm:cxn modelId="{E7623BFF-754F-44D0-B8B0-C261A65D8451}" srcId="{623F773F-579E-4C63-B94E-DF4087BEE8EA}" destId="{B2ACA2FF-195A-4E65-AAFC-84C361CE5EB6}" srcOrd="2" destOrd="0" parTransId="{CE4F3449-77E1-4810-BA1F-217C94A5A663}" sibTransId="{AD723545-7471-4C27-8417-76395C799C16}"/>
     <dgm:cxn modelId="{0765D94C-5DCA-44CF-BED0-17D148FDBE0C}" type="presOf" srcId="{12FE8065-B538-4AF9-8AE9-05180E01028F}" destId="{6B5BF96D-4DD2-4D52-966D-E08B4D2E8F60}" srcOrd="0" destOrd="0" presId="urn:microsoft.com/office/officeart/2005/8/layout/vProcess5"/>
     <dgm:cxn modelId="{EC11CF9C-1E96-449E-A708-E7063DB59F85}" type="presOf" srcId="{12FE8065-B538-4AF9-8AE9-05180E01028F}" destId="{BB0AD82C-F441-42E7-B0C1-75F42CBC4819}" srcOrd="1" destOrd="0" presId="urn:microsoft.com/office/officeart/2005/8/layout/vProcess5"/>
-    <dgm:cxn modelId="{F7B77232-6FDB-4639-B7D5-90DB95D450F6}" type="presOf" srcId="{623F773F-579E-4C63-B94E-DF4087BEE8EA}" destId="{EFF79F8C-4480-1C4D-83BA-FC272F236144}" srcOrd="0" destOrd="0" presId="urn:microsoft.com/office/officeart/2005/8/layout/vProcess5"/>
-    <dgm:cxn modelId="{8C4225ED-9024-43B9-990A-FF1DD3495FBF}" srcId="{623F773F-579E-4C63-B94E-DF4087BEE8EA}" destId="{34F39992-FA21-4492-BF69-0EDCF883FFA5}" srcOrd="0" destOrd="0" parTransId="{23136E4E-EAAA-4164-8A68-8E0FE20CFCB4}" sibTransId="{F5E8D9EE-AB4A-42C5-A999-C2707837A474}"/>
-    <dgm:cxn modelId="{09FF9245-6220-421E-8E97-9DC4842E85AF}" type="presOf" srcId="{FA8F47D9-39E5-497A-A5B7-3B0306D080B4}" destId="{03A58761-99AC-40E3-9DF5-E9C9E487FA44}" srcOrd="1" destOrd="0" presId="urn:microsoft.com/office/officeart/2005/8/layout/vProcess5"/>
-    <dgm:cxn modelId="{93CB968D-8379-48C8-A382-0B9CD80255E4}" type="presOf" srcId="{AD723545-7471-4C27-8417-76395C799C16}" destId="{2B459D3A-475D-4C2E-BB22-7D16677A64F1}" srcOrd="0" destOrd="0" presId="urn:microsoft.com/office/officeart/2005/8/layout/vProcess5"/>
-    <dgm:cxn modelId="{2B7D6A7C-2511-40E9-87DC-20428B5A243B}" srcId="{623F773F-579E-4C63-B94E-DF4087BEE8EA}" destId="{FA8F47D9-39E5-497A-A5B7-3B0306D080B4}" srcOrd="1" destOrd="0" parTransId="{084DE055-159A-4562-BB9B-3F7808B62134}" sibTransId="{02E82412-62FE-4CFD-976D-170251FC51D4}"/>
-    <dgm:cxn modelId="{E7623BFF-754F-44D0-B8B0-C261A65D8451}" srcId="{623F773F-579E-4C63-B94E-DF4087BEE8EA}" destId="{B2ACA2FF-195A-4E65-AAFC-84C361CE5EB6}" srcOrd="2" destOrd="0" parTransId="{CE4F3449-77E1-4810-BA1F-217C94A5A663}" sibTransId="{AD723545-7471-4C27-8417-76395C799C16}"/>
-    <dgm:cxn modelId="{E60779A6-6B59-48D2-82BF-5C1C313BD657}" type="presOf" srcId="{28DB6A8F-B208-45E8-AA41-F3327B84633E}" destId="{0C07DECC-3F0E-4AE1-A5BD-87AB46EE4141}" srcOrd="1" destOrd="0" presId="urn:microsoft.com/office/officeart/2005/8/layout/vProcess5"/>
-    <dgm:cxn modelId="{A281EF8D-5A1E-4A89-851E-2578C19A83A5}" type="presOf" srcId="{34F39992-FA21-4492-BF69-0EDCF883FFA5}" destId="{CDB0C44B-15F8-4EF4-9C6E-041E254F036E}" srcOrd="1" destOrd="0" presId="urn:microsoft.com/office/officeart/2005/8/layout/vProcess5"/>
-    <dgm:cxn modelId="{ABBE9EB3-A818-43E3-9383-D012130587C8}" type="presOf" srcId="{B2ACA2FF-195A-4E65-AAFC-84C361CE5EB6}" destId="{C7F469B1-618C-4E2B-856D-FDA6F5535A3C}" srcOrd="0" destOrd="0" presId="urn:microsoft.com/office/officeart/2005/8/layout/vProcess5"/>
-    <dgm:cxn modelId="{2FA4BC5F-5BEE-4DFF-8C4E-D4C06F6961A0}" type="presOf" srcId="{28DB6A8F-B208-45E8-AA41-F3327B84633E}" destId="{E722A8E2-BA3F-448E-883E-DA2C099F64AD}" srcOrd="0" destOrd="0" presId="urn:microsoft.com/office/officeart/2005/8/layout/vProcess5"/>
-    <dgm:cxn modelId="{A0BEDDDE-B9C5-4277-855F-2424205B9D1D}" type="presOf" srcId="{F5E8D9EE-AB4A-42C5-A999-C2707837A474}" destId="{D3A78DF3-2E52-4866-8F67-88584A429910}" srcOrd="0" destOrd="0" presId="urn:microsoft.com/office/officeart/2005/8/layout/vProcess5"/>
-    <dgm:cxn modelId="{60FA6890-357A-433C-89BC-57C58E3AC5F4}" srcId="{623F773F-579E-4C63-B94E-DF4087BEE8EA}" destId="{28DB6A8F-B208-45E8-AA41-F3327B84633E}" srcOrd="3" destOrd="0" parTransId="{D578B9E5-F658-421B-BCCA-8A0D1C06E979}" sibTransId="{5F12878A-FD93-403F-933D-D7CB5F3E8A6D}"/>
     <dgm:cxn modelId="{FF8BE633-8D17-4D93-89A6-4DEFC5C47831}" srcId="{623F773F-579E-4C63-B94E-DF4087BEE8EA}" destId="{12FE8065-B538-4AF9-8AE9-05180E01028F}" srcOrd="4" destOrd="0" parTransId="{E2F360DD-61FF-482D-8082-465ACC50A7A4}" sibTransId="{8556636E-A008-4803-855A-C4A4C8598AC9}"/>
-    <dgm:cxn modelId="{48DC9954-70FF-44AB-803D-75C2A67128A4}" type="presOf" srcId="{5F12878A-FD93-403F-933D-D7CB5F3E8A6D}" destId="{49DB2F62-C230-4480-9397-D4EA7FD0CA47}" srcOrd="0" destOrd="0" presId="urn:microsoft.com/office/officeart/2005/8/layout/vProcess5"/>
-    <dgm:cxn modelId="{465F210B-E524-4F05-B79A-A96506258EBB}" type="presOf" srcId="{02E82412-62FE-4CFD-976D-170251FC51D4}" destId="{79A7FC6B-B67B-4328-9A09-FCEE1AEEE30F}" srcOrd="0" destOrd="0" presId="urn:microsoft.com/office/officeart/2005/8/layout/vProcess5"/>
-    <dgm:cxn modelId="{6788945B-0F4C-4D98-B860-EA09DCE43159}" type="presOf" srcId="{34F39992-FA21-4492-BF69-0EDCF883FFA5}" destId="{63189335-FAAF-402E-8E6E-CFD5AE29E014}" srcOrd="0" destOrd="0" presId="urn:microsoft.com/office/officeart/2005/8/layout/vProcess5"/>
-    <dgm:cxn modelId="{30274B78-07EC-47C4-A9CF-1248B5F746BC}" type="presOf" srcId="{B2ACA2FF-195A-4E65-AAFC-84C361CE5EB6}" destId="{6F383434-44B9-4BDA-9E8B-ED508A1A5405}" srcOrd="1" destOrd="0" presId="urn:microsoft.com/office/officeart/2005/8/layout/vProcess5"/>
     <dgm:cxn modelId="{704380D6-4DD4-4A5F-ACD9-1305BF45D6C2}" type="presParOf" srcId="{EFF79F8C-4480-1C4D-83BA-FC272F236144}" destId="{4DF2ABCA-2227-4041-A02F-981461B42152}" srcOrd="0" destOrd="0" presId="urn:microsoft.com/office/officeart/2005/8/layout/vProcess5"/>
     <dgm:cxn modelId="{24E734FD-0817-43C1-91D8-E1B6FA994915}" type="presParOf" srcId="{EFF79F8C-4480-1C4D-83BA-FC272F236144}" destId="{63189335-FAAF-402E-8E6E-CFD5AE29E014}" srcOrd="1" destOrd="0" presId="urn:microsoft.com/office/officeart/2005/8/layout/vProcess5"/>
     <dgm:cxn modelId="{94CC1F41-FB18-495C-AE29-F55DAE511861}" type="presParOf" srcId="{EFF79F8C-4480-1C4D-83BA-FC272F236144}" destId="{DA441B69-7E9D-49E3-93DD-A887B0CC9C6C}" srcOrd="2" destOrd="0" presId="urn:microsoft.com/office/officeart/2005/8/layout/vProcess5"/>
@@ -3735,7 +3861,7 @@
             <a:fld id="{F59A588C-D2F0-9344-9368-6F19348680A8}" type="datetimeFigureOut">
               <a:rPr lang="en-US" smtClean="0"/>
               <a:pPr/>
-              <a:t>7/29/2019</a:t>
+              <a:t>7/31/2019</a:t>
             </a:fld>
             <a:endParaRPr lang="en-US"/>
           </a:p>
@@ -3903,7 +4029,7 @@
     </p:spTree>
     <p:extLst>
       <p:ext uri="{BB962C8B-B14F-4D97-AF65-F5344CB8AC3E}">
-        <p14:creationId xmlns:p14="http://schemas.microsoft.com/office/powerpoint/2010/main" xmlns="" val="3676630439"/>
+        <p14:creationId xmlns="" xmlns:p14="http://schemas.microsoft.com/office/powerpoint/2010/main" val="3676630439"/>
       </p:ext>
     </p:extLst>
   </p:cSld>
@@ -4115,7 +4241,7 @@
             <a:fld id="{9A7E67C1-4258-3547-AA41-7EBCE41DC071}" type="datetime1">
               <a:rPr lang="en-AU" smtClean="0"/>
               <a:pPr/>
-              <a:t>29/07/2019</a:t>
+              <a:t>31/07/2019</a:t>
             </a:fld>
             <a:endParaRPr lang="en-US" dirty="0"/>
           </a:p>
@@ -4343,7 +4469,7 @@
             <a:fld id="{79C39BBC-32C4-814B-86ED-B854F58EFD0B}" type="datetime1">
               <a:rPr lang="en-AU" smtClean="0"/>
               <a:pPr/>
-              <a:t>29/07/2019</a:t>
+              <a:t>31/07/2019</a:t>
             </a:fld>
             <a:endParaRPr lang="en-US" dirty="0"/>
           </a:p>
@@ -4520,7 +4646,7 @@
             <a:fld id="{2828B671-F14A-564B-A7EC-DA4B69D6C377}" type="datetime1">
               <a:rPr lang="en-AU" smtClean="0"/>
               <a:pPr/>
-              <a:t>29/07/2019</a:t>
+              <a:t>31/07/2019</a:t>
             </a:fld>
             <a:endParaRPr lang="en-US" dirty="0"/>
           </a:p>
@@ -4687,7 +4813,7 @@
             <a:fld id="{536CEDE5-3D26-A74C-B1AD-77BD580B6D23}" type="datetime1">
               <a:rPr lang="en-AU" smtClean="0"/>
               <a:pPr/>
-              <a:t>29/07/2019</a:t>
+              <a:t>31/07/2019</a:t>
             </a:fld>
             <a:endParaRPr lang="en-US" dirty="0"/>
           </a:p>
@@ -4933,7 +5059,7 @@
             <a:fld id="{A4FC82B4-BF71-054A-B89C-E88206290FCC}" type="datetime1">
               <a:rPr lang="en-AU" smtClean="0"/>
               <a:pPr/>
-              <a:t>29/07/2019</a:t>
+              <a:t>31/07/2019</a:t>
             </a:fld>
             <a:endParaRPr lang="en-US" dirty="0"/>
           </a:p>
@@ -5199,7 +5325,7 @@
             <a:fld id="{24633EF3-D291-6542-AFE5-46B1D93BA6AA}" type="datetime1">
               <a:rPr lang="en-AU" smtClean="0"/>
               <a:pPr/>
-              <a:t>29/07/2019</a:t>
+              <a:t>31/07/2019</a:t>
             </a:fld>
             <a:endParaRPr lang="en-US" dirty="0"/>
           </a:p>
@@ -5575,7 +5701,7 @@
             <a:fld id="{E3F09EC6-2ED3-6F49-B530-33101E357F93}" type="datetime1">
               <a:rPr lang="en-AU" smtClean="0"/>
               <a:pPr/>
-              <a:t>29/07/2019</a:t>
+              <a:t>31/07/2019</a:t>
             </a:fld>
             <a:endParaRPr lang="en-US" dirty="0"/>
           </a:p>
@@ -5690,7 +5816,7 @@
             <a:fld id="{23B3D574-0A57-AB44-8121-78FD889DAAB9}" type="datetime1">
               <a:rPr lang="en-AU" smtClean="0"/>
               <a:pPr/>
-              <a:t>29/07/2019</a:t>
+              <a:t>31/07/2019</a:t>
             </a:fld>
             <a:endParaRPr lang="en-US" dirty="0"/>
           </a:p>
@@ -5782,7 +5908,7 @@
             <a:fld id="{EB15F923-CC78-8C47-A833-BD71DCE598C1}" type="datetime1">
               <a:rPr lang="en-AU" smtClean="0"/>
               <a:pPr/>
-              <a:t>29/07/2019</a:t>
+              <a:t>31/07/2019</a:t>
             </a:fld>
             <a:endParaRPr lang="en-US" dirty="0"/>
           </a:p>
@@ -6042,7 +6168,7 @@
             <a:fld id="{B9E2F670-C4DA-A444-A089-94123C735B76}" type="datetime1">
               <a:rPr lang="en-AU" smtClean="0"/>
               <a:pPr/>
-              <a:t>29/07/2019</a:t>
+              <a:t>31/07/2019</a:t>
             </a:fld>
             <a:endParaRPr lang="en-US" dirty="0"/>
           </a:p>
@@ -6308,7 +6434,7 @@
             <a:fld id="{563A8730-11BE-9B45-B174-5342FE21C0A3}" type="datetime1">
               <a:rPr lang="en-AU" smtClean="0"/>
               <a:pPr/>
-              <a:t>29/07/2019</a:t>
+              <a:t>31/07/2019</a:t>
             </a:fld>
             <a:endParaRPr lang="en-US" dirty="0"/>
           </a:p>
@@ -6527,7 +6653,7 @@
             <a:fld id="{ABF2F178-75AF-4541-89C5-F9415BD48E21}" type="datetime1">
               <a:rPr lang="en-AU" smtClean="0"/>
               <a:pPr/>
-              <a:t>29/07/2019</a:t>
+              <a:t>31/07/2019</a:t>
             </a:fld>
             <a:endParaRPr lang="en-US" dirty="0"/>
           </a:p>
@@ -6988,10 +7114,10 @@
           <p:cNvPr id="8" name="Rectangle 7">
             <a:extLst>
               <a:ext uri="{FF2B5EF4-FFF2-40B4-BE49-F238E27FC236}">
-                <a16:creationId xmlns:a16="http://schemas.microsoft.com/office/drawing/2014/main" xmlns="" id="{B5F9E98A-4FF4-43D6-9C48-6DF0E7F2D272}"/>
+                <a16:creationId xmlns="" xmlns:a16="http://schemas.microsoft.com/office/drawing/2014/main" id="{B5F9E98A-4FF4-43D6-9C48-6DF0E7F2D272}"/>
               </a:ext>
               <a:ext uri="{C183D7F6-B498-43B3-948B-1728B52AA6E4}">
-                <adec:decorative xmlns:adec="http://schemas.microsoft.com/office/drawing/2017/decorative" xmlns="" val="1"/>
+                <adec:decorative xmlns="" xmlns:adec="http://schemas.microsoft.com/office/drawing/2017/decorative" val="1"/>
               </a:ext>
             </a:extLst>
           </p:cNvPr>
@@ -7001,7 +7127,7 @@
           <p:nvPr>
             <p:extLst>
               <p:ext uri="{386F3935-93C4-4BCD-93E2-E3B085C9AB24}">
-                <p16:designElem xmlns:p16="http://schemas.microsoft.com/office/powerpoint/2015/main" xmlns="" val="1"/>
+                <p16:designElem xmlns="" xmlns:p16="http://schemas.microsoft.com/office/powerpoint/2015/main" val="1"/>
               </p:ext>
             </p:extLst>
           </p:nvPr>
@@ -7048,10 +7174,10 @@
           <p:cNvPr id="10" name="Rectangle 9">
             <a:extLst>
               <a:ext uri="{FF2B5EF4-FFF2-40B4-BE49-F238E27FC236}">
-                <a16:creationId xmlns:a16="http://schemas.microsoft.com/office/drawing/2014/main" xmlns="" id="{D207A636-DC99-4588-80C4-9E069B97C3FD}"/>
+                <a16:creationId xmlns="" xmlns:a16="http://schemas.microsoft.com/office/drawing/2014/main" id="{D207A636-DC99-4588-80C4-9E069B97C3FD}"/>
               </a:ext>
               <a:ext uri="{C183D7F6-B498-43B3-948B-1728B52AA6E4}">
-                <adec:decorative xmlns:adec="http://schemas.microsoft.com/office/drawing/2017/decorative" xmlns="" val="1"/>
+                <adec:decorative xmlns="" xmlns:adec="http://schemas.microsoft.com/office/drawing/2017/decorative" val="1"/>
               </a:ext>
             </a:extLst>
           </p:cNvPr>
@@ -7061,7 +7187,7 @@
           <p:nvPr>
             <p:extLst>
               <p:ext uri="{386F3935-93C4-4BCD-93E2-E3B085C9AB24}">
-                <p16:designElem xmlns:p16="http://schemas.microsoft.com/office/powerpoint/2015/main" xmlns="" val="1"/>
+                <p16:designElem xmlns="" xmlns:p16="http://schemas.microsoft.com/office/powerpoint/2015/main" val="1"/>
               </p:ext>
             </p:extLst>
           </p:nvPr>
@@ -7122,7 +7248,7 @@
           <p:cNvPr id="2" name="Title 1">
             <a:extLst>
               <a:ext uri="{FF2B5EF4-FFF2-40B4-BE49-F238E27FC236}">
-                <a16:creationId xmlns:a16="http://schemas.microsoft.com/office/drawing/2014/main" xmlns="" id="{30CC5F0C-0384-294E-AFF4-EB1AA3CEB459}"/>
+                <a16:creationId xmlns="" xmlns:a16="http://schemas.microsoft.com/office/drawing/2014/main" id="{30CC5F0C-0384-294E-AFF4-EB1AA3CEB459}"/>
               </a:ext>
             </a:extLst>
           </p:cNvPr>
@@ -7198,7 +7324,7 @@
           <p:cNvPr id="3" name="Subtitle 2">
             <a:extLst>
               <a:ext uri="{FF2B5EF4-FFF2-40B4-BE49-F238E27FC236}">
-                <a16:creationId xmlns:a16="http://schemas.microsoft.com/office/drawing/2014/main" xmlns="" id="{FE087BB3-D7F6-AF41-8F68-B3229C897D36}"/>
+                <a16:creationId xmlns="" xmlns:a16="http://schemas.microsoft.com/office/drawing/2014/main" id="{FE087BB3-D7F6-AF41-8F68-B3229C897D36}"/>
               </a:ext>
             </a:extLst>
           </p:cNvPr>
@@ -7230,10 +7356,10 @@
           <p:cNvPr id="12" name="Straight Connector 11">
             <a:extLst>
               <a:ext uri="{FF2B5EF4-FFF2-40B4-BE49-F238E27FC236}">
-                <a16:creationId xmlns:a16="http://schemas.microsoft.com/office/drawing/2014/main" xmlns="" id="{0F2BAA51-3181-4303-929A-FCD9C33F8900}"/>
+                <a16:creationId xmlns="" xmlns:a16="http://schemas.microsoft.com/office/drawing/2014/main" id="{0F2BAA51-3181-4303-929A-FCD9C33F8900}"/>
               </a:ext>
               <a:ext uri="{C183D7F6-B498-43B3-948B-1728B52AA6E4}">
-                <adec:decorative xmlns:adec="http://schemas.microsoft.com/office/drawing/2017/decorative" xmlns="" val="1"/>
+                <adec:decorative xmlns="" xmlns:adec="http://schemas.microsoft.com/office/drawing/2017/decorative" val="1"/>
               </a:ext>
             </a:extLst>
           </p:cNvPr>
@@ -7243,7 +7369,7 @@
           <p:nvPr>
             <p:extLst>
               <p:ext uri="{386F3935-93C4-4BCD-93E2-E3B085C9AB24}">
-                <p16:designElem xmlns:p16="http://schemas.microsoft.com/office/powerpoint/2015/main" xmlns="" val="1"/>
+                <p16:designElem xmlns="" xmlns:p16="http://schemas.microsoft.com/office/powerpoint/2015/main" val="1"/>
               </p:ext>
             </p:extLst>
           </p:nvPr>
@@ -7282,10 +7408,10 @@
           <p:cNvPr id="14" name="Picture 13">
             <a:extLst>
               <a:ext uri="{FF2B5EF4-FFF2-40B4-BE49-F238E27FC236}">
-                <a16:creationId xmlns:a16="http://schemas.microsoft.com/office/drawing/2014/main" xmlns="" id="{D4ED6A5F-3B06-48C5-850F-8045C4DF69AE}"/>
+                <a16:creationId xmlns="" xmlns:a16="http://schemas.microsoft.com/office/drawing/2014/main" id="{D4ED6A5F-3B06-48C5-850F-8045C4DF69AE}"/>
               </a:ext>
               <a:ext uri="{C183D7F6-B498-43B3-948B-1728B52AA6E4}">
-                <adec:decorative xmlns:adec="http://schemas.microsoft.com/office/drawing/2017/decorative" xmlns="" val="1"/>
+                <adec:decorative xmlns="" xmlns:adec="http://schemas.microsoft.com/office/drawing/2017/decorative" val="1"/>
               </a:ext>
             </a:extLst>
           </p:cNvPr>
@@ -7295,7 +7421,7 @@
           <p:nvPr>
             <p:extLst>
               <p:ext uri="{386F3935-93C4-4BCD-93E2-E3B085C9AB24}">
-                <p16:designElem xmlns:p16="http://schemas.microsoft.com/office/powerpoint/2015/main" xmlns="" val="1"/>
+                <p16:designElem xmlns="" xmlns:p16="http://schemas.microsoft.com/office/powerpoint/2015/main" val="1"/>
               </p:ext>
             </p:extLst>
           </p:nvPr>
@@ -7304,7 +7430,7 @@
           <a:blip r:embed="rId2">
             <a:extLst>
               <a:ext uri="{28A0092B-C50C-407E-A947-70E740481C1C}">
-                <a14:useLocalDpi xmlns:a14="http://schemas.microsoft.com/office/drawing/2010/main" xmlns="" val="0"/>
+                <a14:useLocalDpi xmlns="" xmlns:a14="http://schemas.microsoft.com/office/drawing/2010/main" val="0"/>
               </a:ext>
             </a:extLst>
           </a:blip>
@@ -7326,10 +7452,10 @@
           <p:cNvPr id="16" name="Straight Connector 15">
             <a:extLst>
               <a:ext uri="{FF2B5EF4-FFF2-40B4-BE49-F238E27FC236}">
-                <a16:creationId xmlns:a16="http://schemas.microsoft.com/office/drawing/2014/main" xmlns="" id="{C9A60B9D-8DAC-4DA9-88DE-9911621A2B96}"/>
+                <a16:creationId xmlns="" xmlns:a16="http://schemas.microsoft.com/office/drawing/2014/main" id="{C9A60B9D-8DAC-4DA9-88DE-9911621A2B96}"/>
               </a:ext>
               <a:ext uri="{C183D7F6-B498-43B3-948B-1728B52AA6E4}">
-                <adec:decorative xmlns:adec="http://schemas.microsoft.com/office/drawing/2017/decorative" xmlns="" val="1"/>
+                <adec:decorative xmlns="" xmlns:adec="http://schemas.microsoft.com/office/drawing/2017/decorative" val="1"/>
               </a:ext>
             </a:extLst>
           </p:cNvPr>
@@ -7339,7 +7465,7 @@
           <p:nvPr>
             <p:extLst>
               <p:ext uri="{386F3935-93C4-4BCD-93E2-E3B085C9AB24}">
-                <p16:designElem xmlns:p16="http://schemas.microsoft.com/office/powerpoint/2015/main" xmlns="" val="1"/>
+                <p16:designElem xmlns="" xmlns:p16="http://schemas.microsoft.com/office/powerpoint/2015/main" val="1"/>
               </p:ext>
             </p:extLst>
           </p:nvPr>
@@ -7428,13 +7554,20 @@
     </p:spTree>
     <p:extLst>
       <p:ext uri="{BB962C8B-B14F-4D97-AF65-F5344CB8AC3E}">
-        <p14:creationId xmlns:p14="http://schemas.microsoft.com/office/powerpoint/2010/main" xmlns="" val="943850408"/>
+        <p14:creationId xmlns="" xmlns:p14="http://schemas.microsoft.com/office/powerpoint/2010/main" val="943850408"/>
       </p:ext>
     </p:extLst>
   </p:cSld>
   <p:clrMapOvr>
     <a:overrideClrMapping bg1="dk1" tx1="lt1" bg2="dk2" tx2="lt2" accent1="accent1" accent2="accent2" accent3="accent3" accent4="accent4" accent5="accent5" accent6="accent6" hlink="hlink" folHlink="folHlink"/>
   </p:clrMapOvr>
+  <p:timing>
+    <p:tnLst>
+      <p:par>
+        <p:cTn id="1" dur="indefinite" restart="never" nodeType="tmRoot"/>
+      </p:par>
+    </p:tnLst>
+  </p:timing>
 </p:sld>
 </file>
 
@@ -7484,7 +7617,7 @@
           <p:cNvPr id="2" name="Title 1">
             <a:extLst>
               <a:ext uri="{FF2B5EF4-FFF2-40B4-BE49-F238E27FC236}">
-                <a16:creationId xmlns:a16="http://schemas.microsoft.com/office/drawing/2014/main" xmlns="" id="{7F0BD05E-A7CD-2045-8213-AC58A5086B53}"/>
+                <a16:creationId xmlns="" xmlns:a16="http://schemas.microsoft.com/office/drawing/2014/main" id="{7F0BD05E-A7CD-2045-8213-AC58A5086B53}"/>
               </a:ext>
             </a:extLst>
           </p:cNvPr>
@@ -7540,26 +7673,14 @@
             </a:r>
             <a:r>
               <a:rPr lang="en-US" sz="1800" dirty="0" smtClean="0"/>
-              <a:t> </a:t>
-            </a:r>
-            <a:r>
-              <a:rPr lang="en-US" sz="1800" dirty="0" smtClean="0"/>
-              <a:t>: </a:t>
+              <a:t> : </a:t>
             </a:r>
             <a:br>
               <a:rPr lang="en-US" sz="1800" dirty="0" smtClean="0"/>
             </a:br>
             <a:r>
               <a:rPr lang="en-IN" sz="2400" dirty="0" smtClean="0"/>
-              <a:t>Predict </a:t>
-            </a:r>
-            <a:r>
-              <a:rPr lang="en-IN" sz="2400" dirty="0" smtClean="0"/>
-              <a:t>the number of dengue fever cases that will be reported within a particular time span using the environmental data from San Juan and </a:t>
-            </a:r>
-            <a:r>
-              <a:rPr lang="en-IN" sz="2400" dirty="0" smtClean="0"/>
-              <a:t>Iquitos cities. </a:t>
+              <a:t>Predict the number of dengue fever cases that will be reported within a particular time span using the environmental data from San Juan and Iquitos cities. </a:t>
             </a:r>
             <a:br>
               <a:rPr lang="en-IN" sz="2400" dirty="0" smtClean="0"/>
@@ -7619,23 +7740,7 @@
             </a:pPr>
             <a:r>
               <a:rPr lang="en-IN" sz="3600" dirty="0" smtClean="0"/>
-              <a:t>Dengue is a viral disease transmitted by Aedes types of mosquitoes. </a:t>
-            </a:r>
-            <a:r>
-              <a:rPr lang="en-IN" sz="3600" dirty="0" smtClean="0"/>
-              <a:t>Mosquitoes become </a:t>
-            </a:r>
-            <a:r>
-              <a:rPr lang="en-IN" sz="3600" dirty="0" smtClean="0"/>
-              <a:t>infected with </a:t>
-            </a:r>
-            <a:r>
-              <a:rPr lang="en-IN" sz="3600" dirty="0" smtClean="0"/>
-              <a:t>dengue after biting sick humans who have dengue virus in their blood. </a:t>
-            </a:r>
-            <a:r>
-              <a:rPr lang="en-IN" sz="3600" dirty="0" smtClean="0"/>
-              <a:t>Between </a:t>
+              <a:t>Dengue is a viral disease transmitted by Aedes types of mosquitoes. Mosquitoes become infected with dengue after biting sick humans who have dengue virus in their blood. Between </a:t>
             </a:r>
             <a:r>
               <a:rPr lang="en-IN" sz="3600" dirty="0" smtClean="0">
@@ -7799,7 +7904,7 @@
     </p:spTree>
     <p:extLst>
       <p:ext uri="{BB962C8B-B14F-4D97-AF65-F5344CB8AC3E}">
-        <p14:creationId xmlns:p14="http://schemas.microsoft.com/office/powerpoint/2010/main" xmlns="" val="4185541886"/>
+        <p14:creationId xmlns="" xmlns:p14="http://schemas.microsoft.com/office/powerpoint/2010/main" val="4185541886"/>
       </p:ext>
     </p:extLst>
   </p:cSld>
@@ -7862,7 +7967,7 @@
           <p:cNvPr id="2" name="Title 1">
             <a:extLst>
               <a:ext uri="{FF2B5EF4-FFF2-40B4-BE49-F238E27FC236}">
-                <a16:creationId xmlns:a16="http://schemas.microsoft.com/office/drawing/2014/main" xmlns="" id="{7F0BD05E-A7CD-2045-8213-AC58A5086B53}"/>
+                <a16:creationId xmlns="" xmlns:a16="http://schemas.microsoft.com/office/drawing/2014/main" id="{7F0BD05E-A7CD-2045-8213-AC58A5086B53}"/>
               </a:ext>
             </a:extLst>
           </p:cNvPr>
@@ -7913,7 +8018,7 @@
             <a:r>
               <a:rPr lang="en-IN" sz="2000" dirty="0" err="1" smtClean="0">
                 <a:solidFill>
-                  <a:schemeClr val="tx1"/>
+                  <a:srgbClr val="FF0000"/>
                 </a:solidFill>
                 <a:hlinkClick r:id="rId2"/>
               </a:rPr>
@@ -7926,14 +8031,6 @@
                 </a:solidFill>
               </a:rPr>
               <a:t>.  </a:t>
-            </a:r>
-            <a:r>
-              <a:rPr lang="en-IN" sz="2000" dirty="0" smtClean="0">
-                <a:solidFill>
-                  <a:schemeClr val="tx1"/>
-                </a:solidFill>
-              </a:rPr>
-              <a:t/>
             </a:r>
             <a:br>
               <a:rPr lang="en-IN" sz="2000" dirty="0" smtClean="0">
@@ -7955,7 +8052,7 @@
           <p:cNvPr id="5" name="TextBox 4">
             <a:extLst>
               <a:ext uri="{FF2B5EF4-FFF2-40B4-BE49-F238E27FC236}">
-                <a16:creationId xmlns:a16="http://schemas.microsoft.com/office/drawing/2014/main" xmlns="" id="{90C90826-4E9B-7D47-9030-8E7A0B9D56E3}"/>
+                <a16:creationId xmlns="" xmlns:a16="http://schemas.microsoft.com/office/drawing/2014/main" id="{90C90826-4E9B-7D47-9030-8E7A0B9D56E3}"/>
               </a:ext>
             </a:extLst>
           </p:cNvPr>
@@ -8025,11 +8122,7 @@
             </a:r>
             <a:r>
               <a:rPr lang="en-US" sz="1600" dirty="0" smtClean="0"/>
-              <a:t>S</a:t>
-            </a:r>
-            <a:r>
-              <a:rPr lang="en-US" sz="1600" dirty="0" smtClean="0"/>
-              <a:t>an Juan </a:t>
+              <a:t>San Juan </a:t>
             </a:r>
             <a:r>
               <a:rPr lang="en-US" sz="1600" dirty="0"/>
@@ -8235,8 +8328,8 @@
         </p:blipFill>
         <p:spPr bwMode="auto">
           <a:xfrm>
-            <a:off x="395983" y="3620654"/>
-            <a:ext cx="11796017" cy="3237345"/>
+            <a:off x="1" y="3620654"/>
+            <a:ext cx="12192000" cy="3237345"/>
           </a:xfrm>
           <a:prstGeom prst="rect">
             <a:avLst/>
@@ -8253,7 +8346,7 @@
     </p:spTree>
     <p:extLst>
       <p:ext uri="{BB962C8B-B14F-4D97-AF65-F5344CB8AC3E}">
-        <p14:creationId xmlns:p14="http://schemas.microsoft.com/office/powerpoint/2010/main" xmlns="" val="295188467"/>
+        <p14:creationId xmlns="" xmlns:p14="http://schemas.microsoft.com/office/powerpoint/2010/main" val="295188467"/>
       </p:ext>
     </p:extLst>
   </p:cSld>
@@ -8573,15 +8666,7 @@
                   <a:srgbClr val="C00000"/>
                 </a:solidFill>
               </a:rPr>
-              <a:t>Month </a:t>
-            </a:r>
-            <a:r>
-              <a:rPr lang="en-IN" sz="2400" dirty="0" smtClean="0">
-                <a:solidFill>
-                  <a:srgbClr val="C00000"/>
-                </a:solidFill>
-              </a:rPr>
-              <a:t>wise pattern </a:t>
+              <a:t>Month wise pattern </a:t>
             </a:r>
             <a:endParaRPr lang="en-IN" sz="2400" dirty="0">
               <a:solidFill>
@@ -8628,6 +8713,13 @@
   <p:clrMapOvr>
     <a:masterClrMapping/>
   </p:clrMapOvr>
+  <p:timing>
+    <p:tnLst>
+      <p:par>
+        <p:cTn id="1" dur="indefinite" restart="never" nodeType="tmRoot"/>
+      </p:par>
+    </p:tnLst>
+  </p:timing>
 </p:sld>
 </file>
 
@@ -8677,7 +8769,7 @@
           <p:cNvPr id="6" name="Content Placeholder 2">
             <a:extLst>
               <a:ext uri="{FF2B5EF4-FFF2-40B4-BE49-F238E27FC236}">
-                <a16:creationId xmlns:a16="http://schemas.microsoft.com/office/drawing/2014/main" xmlns="" id="{BE8FAC55-67F5-46B6-94B7-CE10CC694898}"/>
+                <a16:creationId xmlns="" xmlns:a16="http://schemas.microsoft.com/office/drawing/2014/main" id="{BE8FAC55-67F5-46B6-94B7-CE10CC694898}"/>
               </a:ext>
             </a:extLst>
           </p:cNvPr>
@@ -8688,7 +8780,7 @@
             <p:ph idx="1"/>
             <p:extLst>
               <p:ext uri="{D42A27DB-BD31-4B8C-83A1-F6EECF244321}">
-                <p14:modId xmlns:p14="http://schemas.microsoft.com/office/powerpoint/2010/main" xmlns="" val="50507251"/>
+                <p14:modId xmlns="" xmlns:p14="http://schemas.microsoft.com/office/powerpoint/2010/main" val="50507251"/>
               </p:ext>
             </p:extLst>
           </p:nvPr>
@@ -8804,7 +8896,7 @@
         <p:spPr>
           <a:xfrm>
             <a:off x="295564" y="267855"/>
-            <a:ext cx="4073236" cy="523220"/>
+            <a:ext cx="6105236" cy="523220"/>
           </a:xfrm>
           <a:prstGeom prst="rect">
             <a:avLst/>
@@ -8823,7 +8915,7 @@
                   <a:srgbClr val="C00000"/>
                 </a:solidFill>
               </a:rPr>
-              <a:t>Work Flow</a:t>
+              <a:t>Work Flow of individual modelling</a:t>
             </a:r>
             <a:endParaRPr lang="en-IN" sz="2800" dirty="0">
               <a:solidFill>
@@ -9135,7 +9227,7 @@
                   <a:srgbClr val="C00000"/>
                 </a:solidFill>
               </a:rPr>
-              <a:t>ARIMA Regression</a:t>
+              <a:t>OLS Regression</a:t>
             </a:r>
             <a:endParaRPr lang="en-IN" dirty="0">
               <a:solidFill>
@@ -9234,20 +9326,12 @@
           <a:p>
             <a:pPr algn="ctr"/>
             <a:r>
-              <a:rPr lang="en-IN" dirty="0" err="1" smtClean="0">
-                <a:solidFill>
-                  <a:srgbClr val="C00000"/>
-                </a:solidFill>
-              </a:rPr>
-              <a:t>XGBoost</a:t>
-            </a:r>
-            <a:r>
               <a:rPr lang="en-IN" dirty="0" smtClean="0">
                 <a:solidFill>
                   <a:srgbClr val="C00000"/>
                 </a:solidFill>
               </a:rPr>
-              <a:t> Regression</a:t>
+              <a:t>XGBoost Regression</a:t>
             </a:r>
             <a:endParaRPr lang="en-IN" dirty="0">
               <a:solidFill>
@@ -9262,6 +9346,13 @@
   <p:clrMapOvr>
     <a:masterClrMapping/>
   </p:clrMapOvr>
+  <p:timing>
+    <p:tnLst>
+      <p:par>
+        <p:cTn id="1" dur="indefinite" restart="never" nodeType="tmRoot"/>
+      </p:par>
+    </p:tnLst>
+  </p:timing>
 </p:sld>
 </file>
 
@@ -9314,8 +9405,8 @@
         </p:nvSpPr>
         <p:spPr>
           <a:xfrm>
-            <a:off x="1089901" y="1203045"/>
-            <a:ext cx="4100944" cy="477973"/>
+            <a:off x="3288069" y="1110685"/>
+            <a:ext cx="3380547" cy="477973"/>
           </a:xfrm>
           <a:prstGeom prst="rect">
             <a:avLst/>
@@ -9366,8 +9457,8 @@
         </p:nvSpPr>
         <p:spPr>
           <a:xfrm>
-            <a:off x="1089901" y="1872681"/>
-            <a:ext cx="4100944" cy="475667"/>
+            <a:off x="3288069" y="1780321"/>
+            <a:ext cx="3380547" cy="475667"/>
           </a:xfrm>
           <a:prstGeom prst="rect">
             <a:avLst/>
@@ -9418,8 +9509,8 @@
         </p:nvSpPr>
         <p:spPr>
           <a:xfrm>
-            <a:off x="1089901" y="2521527"/>
-            <a:ext cx="4100944" cy="475667"/>
+            <a:off x="3288069" y="2429167"/>
+            <a:ext cx="3380547" cy="475667"/>
           </a:xfrm>
           <a:prstGeom prst="rect">
             <a:avLst/>
@@ -9470,8 +9561,8 @@
         </p:nvSpPr>
         <p:spPr>
           <a:xfrm>
-            <a:off x="1089901" y="3105730"/>
-            <a:ext cx="4100944" cy="475667"/>
+            <a:off x="3288069" y="3013370"/>
+            <a:ext cx="3380547" cy="475667"/>
           </a:xfrm>
           <a:prstGeom prst="rect">
             <a:avLst/>
@@ -9499,20 +9590,12 @@
           <a:p>
             <a:pPr algn="ctr"/>
             <a:r>
-              <a:rPr lang="en-IN" dirty="0" err="1" smtClean="0">
-                <a:solidFill>
-                  <a:srgbClr val="C00000"/>
-                </a:solidFill>
-              </a:rPr>
-              <a:t>XGBoost</a:t>
-            </a:r>
-            <a:r>
               <a:rPr lang="en-IN" dirty="0" smtClean="0">
                 <a:solidFill>
                   <a:srgbClr val="C00000"/>
                 </a:solidFill>
               </a:rPr>
-              <a:t> Regression</a:t>
+              <a:t>XGBoost Regression</a:t>
             </a:r>
             <a:endParaRPr lang="en-IN" dirty="0">
               <a:solidFill>
@@ -9522,11 +9605,1556 @@
           </a:p>
         </p:txBody>
       </p:sp>
+      <p:sp>
+        <p:nvSpPr>
+          <p:cNvPr id="7" name="TextBox 6"/>
+          <p:cNvSpPr txBox="1"/>
+          <p:nvPr/>
+        </p:nvSpPr>
+        <p:spPr>
+          <a:xfrm>
+            <a:off x="332509" y="110959"/>
+            <a:ext cx="3592946" cy="461665"/>
+          </a:xfrm>
+          <a:prstGeom prst="rect">
+            <a:avLst/>
+          </a:prstGeom>
+          <a:noFill/>
+        </p:spPr>
+        <p:txBody>
+          <a:bodyPr wrap="square" rtlCol="0">
+            <a:spAutoFit/>
+          </a:bodyPr>
+          <a:lstStyle/>
+          <a:p>
+            <a:r>
+              <a:rPr lang="en-IN" sz="2400" b="1" dirty="0" smtClean="0">
+                <a:solidFill>
+                  <a:schemeClr val="bg1">
+                    <a:lumMod val="95000"/>
+                    <a:lumOff val="5000"/>
+                  </a:schemeClr>
+                </a:solidFill>
+              </a:rPr>
+              <a:t>Stacking Ensemble</a:t>
+            </a:r>
+            <a:endParaRPr lang="en-IN" sz="2400" b="1" dirty="0">
+              <a:solidFill>
+                <a:schemeClr val="bg1">
+                  <a:lumMod val="95000"/>
+                  <a:lumOff val="5000"/>
+                </a:schemeClr>
+              </a:solidFill>
+            </a:endParaRPr>
+          </a:p>
+        </p:txBody>
+      </p:sp>
+      <p:sp>
+        <p:nvSpPr>
+          <p:cNvPr id="8" name="TextBox 7"/>
+          <p:cNvSpPr txBox="1"/>
+          <p:nvPr/>
+        </p:nvSpPr>
+        <p:spPr>
+          <a:xfrm>
+            <a:off x="3278850" y="563488"/>
+            <a:ext cx="2244437" cy="369332"/>
+          </a:xfrm>
+          <a:prstGeom prst="rect">
+            <a:avLst/>
+          </a:prstGeom>
+          <a:noFill/>
+        </p:spPr>
+        <p:txBody>
+          <a:bodyPr wrap="square" rtlCol="0">
+            <a:spAutoFit/>
+          </a:bodyPr>
+          <a:lstStyle/>
+          <a:p>
+            <a:r>
+              <a:rPr lang="en-IN" dirty="0" smtClean="0">
+                <a:solidFill>
+                  <a:srgbClr val="C00000"/>
+                </a:solidFill>
+              </a:rPr>
+              <a:t>base level models</a:t>
+            </a:r>
+            <a:endParaRPr lang="en-IN" dirty="0">
+              <a:solidFill>
+                <a:srgbClr val="C00000"/>
+              </a:solidFill>
+            </a:endParaRPr>
+          </a:p>
+        </p:txBody>
+      </p:sp>
+      <p:grpSp>
+        <p:nvGrpSpPr>
+          <p:cNvPr id="19" name="Group 18"/>
+          <p:cNvGrpSpPr/>
+          <p:nvPr/>
+        </p:nvGrpSpPr>
+        <p:grpSpPr>
+          <a:xfrm>
+            <a:off x="979016" y="870533"/>
+            <a:ext cx="1773362" cy="2770909"/>
+            <a:chOff x="4793669" y="4301833"/>
+            <a:chExt cx="1717951" cy="2770909"/>
+          </a:xfrm>
+        </p:grpSpPr>
+        <p:sp>
+          <p:nvSpPr>
+            <p:cNvPr id="18" name="Rectangle 17"/>
+            <p:cNvSpPr/>
+            <p:nvPr/>
+          </p:nvSpPr>
+          <p:spPr>
+            <a:xfrm>
+              <a:off x="4793669" y="4301833"/>
+              <a:ext cx="1717951" cy="2770909"/>
+            </a:xfrm>
+            <a:prstGeom prst="rect">
+              <a:avLst/>
+            </a:prstGeom>
+          </p:spPr>
+          <p:style>
+            <a:lnRef idx="2">
+              <a:schemeClr val="accent1">
+                <a:shade val="50000"/>
+              </a:schemeClr>
+            </a:lnRef>
+            <a:fillRef idx="1">
+              <a:schemeClr val="accent1"/>
+            </a:fillRef>
+            <a:effectRef idx="0">
+              <a:schemeClr val="accent1"/>
+            </a:effectRef>
+            <a:fontRef idx="minor">
+              <a:schemeClr val="lt1"/>
+            </a:fontRef>
+          </p:style>
+          <p:txBody>
+            <a:bodyPr rtlCol="0" anchor="ctr"/>
+            <a:lstStyle/>
+            <a:p>
+              <a:pPr algn="ctr"/>
+              <a:r>
+                <a:rPr lang="en-IN" dirty="0" smtClean="0">
+                  <a:solidFill>
+                    <a:srgbClr val="C00000"/>
+                  </a:solidFill>
+                </a:rPr>
+                <a:t>K Fold</a:t>
+              </a:r>
+              <a:endParaRPr lang="en-IN" dirty="0">
+                <a:solidFill>
+                  <a:srgbClr val="C00000"/>
+                </a:solidFill>
+              </a:endParaRPr>
+            </a:p>
+          </p:txBody>
+        </p:sp>
+        <p:sp>
+          <p:nvSpPr>
+            <p:cNvPr id="13" name="Rectangle 12"/>
+            <p:cNvSpPr/>
+            <p:nvPr/>
+          </p:nvSpPr>
+          <p:spPr>
+            <a:xfrm>
+              <a:off x="5260100" y="6638607"/>
+              <a:ext cx="785090" cy="286388"/>
+            </a:xfrm>
+            <a:prstGeom prst="rect">
+              <a:avLst/>
+            </a:prstGeom>
+          </p:spPr>
+          <p:style>
+            <a:lnRef idx="2">
+              <a:schemeClr val="accent1">
+                <a:shade val="50000"/>
+              </a:schemeClr>
+            </a:lnRef>
+            <a:fillRef idx="1">
+              <a:schemeClr val="accent1"/>
+            </a:fillRef>
+            <a:effectRef idx="0">
+              <a:schemeClr val="accent1"/>
+            </a:effectRef>
+            <a:fontRef idx="minor">
+              <a:schemeClr val="lt1"/>
+            </a:fontRef>
+          </p:style>
+          <p:txBody>
+            <a:bodyPr rtlCol="0" anchor="ctr"/>
+            <a:lstStyle/>
+            <a:p>
+              <a:pPr algn="ctr"/>
+              <a:r>
+                <a:rPr lang="en-IN" dirty="0" smtClean="0">
+                  <a:solidFill>
+                    <a:srgbClr val="C00000"/>
+                  </a:solidFill>
+                </a:rPr>
+                <a:t>train</a:t>
+              </a:r>
+              <a:endParaRPr lang="en-IN" dirty="0">
+                <a:solidFill>
+                  <a:srgbClr val="C00000"/>
+                </a:solidFill>
+              </a:endParaRPr>
+            </a:p>
+          </p:txBody>
+        </p:sp>
+        <p:sp>
+          <p:nvSpPr>
+            <p:cNvPr id="14" name="Rectangle 13"/>
+            <p:cNvSpPr/>
+            <p:nvPr/>
+          </p:nvSpPr>
+          <p:spPr>
+            <a:xfrm>
+              <a:off x="5260100" y="4904509"/>
+              <a:ext cx="785090" cy="286388"/>
+            </a:xfrm>
+            <a:prstGeom prst="rect">
+              <a:avLst/>
+            </a:prstGeom>
+          </p:spPr>
+          <p:style>
+            <a:lnRef idx="2">
+              <a:schemeClr val="accent1">
+                <a:shade val="50000"/>
+              </a:schemeClr>
+            </a:lnRef>
+            <a:fillRef idx="1">
+              <a:schemeClr val="accent1"/>
+            </a:fillRef>
+            <a:effectRef idx="0">
+              <a:schemeClr val="accent1"/>
+            </a:effectRef>
+            <a:fontRef idx="minor">
+              <a:schemeClr val="lt1"/>
+            </a:fontRef>
+          </p:style>
+          <p:txBody>
+            <a:bodyPr rtlCol="0" anchor="ctr"/>
+            <a:lstStyle/>
+            <a:p>
+              <a:pPr algn="ctr"/>
+              <a:r>
+                <a:rPr lang="en-IN" dirty="0" smtClean="0">
+                  <a:solidFill>
+                    <a:srgbClr val="C00000"/>
+                  </a:solidFill>
+                </a:rPr>
+                <a:t>train</a:t>
+              </a:r>
+              <a:endParaRPr lang="en-IN" dirty="0">
+                <a:solidFill>
+                  <a:srgbClr val="C00000"/>
+                </a:solidFill>
+              </a:endParaRPr>
+            </a:p>
+          </p:txBody>
+        </p:sp>
+        <p:sp>
+          <p:nvSpPr>
+            <p:cNvPr id="15" name="Rectangle 14"/>
+            <p:cNvSpPr/>
+            <p:nvPr/>
+          </p:nvSpPr>
+          <p:spPr>
+            <a:xfrm>
+              <a:off x="5260100" y="4498109"/>
+              <a:ext cx="785090" cy="286388"/>
+            </a:xfrm>
+            <a:prstGeom prst="rect">
+              <a:avLst/>
+            </a:prstGeom>
+          </p:spPr>
+          <p:style>
+            <a:lnRef idx="2">
+              <a:schemeClr val="accent1">
+                <a:shade val="50000"/>
+              </a:schemeClr>
+            </a:lnRef>
+            <a:fillRef idx="1">
+              <a:schemeClr val="accent1"/>
+            </a:fillRef>
+            <a:effectRef idx="0">
+              <a:schemeClr val="accent1"/>
+            </a:effectRef>
+            <a:fontRef idx="minor">
+              <a:schemeClr val="lt1"/>
+            </a:fontRef>
+          </p:style>
+          <p:txBody>
+            <a:bodyPr rtlCol="0" anchor="ctr"/>
+            <a:lstStyle/>
+            <a:p>
+              <a:pPr algn="ctr"/>
+              <a:r>
+                <a:rPr lang="en-IN" dirty="0" smtClean="0">
+                  <a:solidFill>
+                    <a:srgbClr val="C00000"/>
+                  </a:solidFill>
+                </a:rPr>
+                <a:t>train</a:t>
+              </a:r>
+              <a:endParaRPr lang="en-IN" dirty="0">
+                <a:solidFill>
+                  <a:srgbClr val="C00000"/>
+                </a:solidFill>
+              </a:endParaRPr>
+            </a:p>
+          </p:txBody>
+        </p:sp>
+        <p:sp>
+          <p:nvSpPr>
+            <p:cNvPr id="16" name="Rectangle 15"/>
+            <p:cNvSpPr/>
+            <p:nvPr/>
+          </p:nvSpPr>
+          <p:spPr>
+            <a:xfrm>
+              <a:off x="5260100" y="5828145"/>
+              <a:ext cx="785090" cy="286388"/>
+            </a:xfrm>
+            <a:prstGeom prst="rect">
+              <a:avLst/>
+            </a:prstGeom>
+          </p:spPr>
+          <p:style>
+            <a:lnRef idx="2">
+              <a:schemeClr val="accent1">
+                <a:shade val="50000"/>
+              </a:schemeClr>
+            </a:lnRef>
+            <a:fillRef idx="1">
+              <a:schemeClr val="accent1"/>
+            </a:fillRef>
+            <a:effectRef idx="0">
+              <a:schemeClr val="accent1"/>
+            </a:effectRef>
+            <a:fontRef idx="minor">
+              <a:schemeClr val="lt1"/>
+            </a:fontRef>
+          </p:style>
+          <p:txBody>
+            <a:bodyPr rtlCol="0" anchor="ctr"/>
+            <a:lstStyle/>
+            <a:p>
+              <a:pPr algn="ctr"/>
+              <a:r>
+                <a:rPr lang="en-IN" dirty="0" smtClean="0">
+                  <a:solidFill>
+                    <a:srgbClr val="C00000"/>
+                  </a:solidFill>
+                </a:rPr>
+                <a:t>train</a:t>
+              </a:r>
+              <a:endParaRPr lang="en-IN" dirty="0">
+                <a:solidFill>
+                  <a:srgbClr val="C00000"/>
+                </a:solidFill>
+              </a:endParaRPr>
+            </a:p>
+          </p:txBody>
+        </p:sp>
+        <p:sp>
+          <p:nvSpPr>
+            <p:cNvPr id="17" name="Rectangle 16"/>
+            <p:cNvSpPr/>
+            <p:nvPr/>
+          </p:nvSpPr>
+          <p:spPr>
+            <a:xfrm>
+              <a:off x="5260100" y="6273482"/>
+              <a:ext cx="785090" cy="286388"/>
+            </a:xfrm>
+            <a:prstGeom prst="rect">
+              <a:avLst/>
+            </a:prstGeom>
+          </p:spPr>
+          <p:style>
+            <a:lnRef idx="2">
+              <a:schemeClr val="accent1">
+                <a:shade val="50000"/>
+              </a:schemeClr>
+            </a:lnRef>
+            <a:fillRef idx="1">
+              <a:schemeClr val="accent1"/>
+            </a:fillRef>
+            <a:effectRef idx="0">
+              <a:schemeClr val="accent1"/>
+            </a:effectRef>
+            <a:fontRef idx="minor">
+              <a:schemeClr val="lt1"/>
+            </a:fontRef>
+          </p:style>
+          <p:txBody>
+            <a:bodyPr rtlCol="0" anchor="ctr"/>
+            <a:lstStyle/>
+            <a:p>
+              <a:pPr algn="ctr"/>
+              <a:r>
+                <a:rPr lang="en-IN" dirty="0" smtClean="0">
+                  <a:solidFill>
+                    <a:srgbClr val="C00000"/>
+                  </a:solidFill>
+                </a:rPr>
+                <a:t>train</a:t>
+              </a:r>
+              <a:endParaRPr lang="en-IN" dirty="0">
+                <a:solidFill>
+                  <a:srgbClr val="C00000"/>
+                </a:solidFill>
+              </a:endParaRPr>
+            </a:p>
+          </p:txBody>
+        </p:sp>
+      </p:grpSp>
+      <p:sp>
+        <p:nvSpPr>
+          <p:cNvPr id="20" name="Right Arrow 19"/>
+          <p:cNvSpPr/>
+          <p:nvPr/>
+        </p:nvSpPr>
+        <p:spPr>
+          <a:xfrm>
+            <a:off x="2752378" y="1967358"/>
+            <a:ext cx="387947" cy="937476"/>
+          </a:xfrm>
+          <a:prstGeom prst="rightArrow">
+            <a:avLst/>
+          </a:prstGeom>
+        </p:spPr>
+        <p:style>
+          <a:lnRef idx="2">
+            <a:schemeClr val="accent1">
+              <a:shade val="50000"/>
+            </a:schemeClr>
+          </a:lnRef>
+          <a:fillRef idx="1">
+            <a:schemeClr val="accent1"/>
+          </a:fillRef>
+          <a:effectRef idx="0">
+            <a:schemeClr val="accent1"/>
+          </a:effectRef>
+          <a:fontRef idx="minor">
+            <a:schemeClr val="lt1"/>
+          </a:fontRef>
+        </p:style>
+        <p:txBody>
+          <a:bodyPr rtlCol="0" anchor="ctr"/>
+          <a:lstStyle/>
+          <a:p>
+            <a:pPr algn="ctr"/>
+            <a:endParaRPr lang="en-IN"/>
+          </a:p>
+        </p:txBody>
+      </p:sp>
+      <p:sp>
+        <p:nvSpPr>
+          <p:cNvPr id="21" name="Rectangle 20"/>
+          <p:cNvSpPr/>
+          <p:nvPr/>
+        </p:nvSpPr>
+        <p:spPr>
+          <a:xfrm>
+            <a:off x="979016" y="4009732"/>
+            <a:ext cx="1736474" cy="477973"/>
+          </a:xfrm>
+          <a:prstGeom prst="rect">
+            <a:avLst/>
+          </a:prstGeom>
+        </p:spPr>
+        <p:style>
+          <a:lnRef idx="2">
+            <a:schemeClr val="accent1">
+              <a:shade val="50000"/>
+            </a:schemeClr>
+          </a:lnRef>
+          <a:fillRef idx="1">
+            <a:schemeClr val="accent1"/>
+          </a:fillRef>
+          <a:effectRef idx="0">
+            <a:schemeClr val="accent1"/>
+          </a:effectRef>
+          <a:fontRef idx="minor">
+            <a:schemeClr val="lt1"/>
+          </a:fontRef>
+        </p:style>
+        <p:txBody>
+          <a:bodyPr rtlCol="0" anchor="ctr"/>
+          <a:lstStyle/>
+          <a:p>
+            <a:pPr algn="ctr"/>
+            <a:r>
+              <a:rPr lang="en-IN" dirty="0" smtClean="0">
+                <a:solidFill>
+                  <a:srgbClr val="C00000"/>
+                </a:solidFill>
+              </a:rPr>
+              <a:t>Test data</a:t>
+            </a:r>
+            <a:endParaRPr lang="en-IN" dirty="0">
+              <a:solidFill>
+                <a:srgbClr val="C00000"/>
+              </a:solidFill>
+            </a:endParaRPr>
+          </a:p>
+        </p:txBody>
+      </p:sp>
+      <p:sp>
+        <p:nvSpPr>
+          <p:cNvPr id="24" name="Cube 23"/>
+          <p:cNvSpPr/>
+          <p:nvPr/>
+        </p:nvSpPr>
+        <p:spPr>
+          <a:xfrm>
+            <a:off x="9171671" y="1110685"/>
+            <a:ext cx="1154545" cy="2378352"/>
+          </a:xfrm>
+          <a:prstGeom prst="cube">
+            <a:avLst/>
+          </a:prstGeom>
+        </p:spPr>
+        <p:style>
+          <a:lnRef idx="2">
+            <a:schemeClr val="accent1">
+              <a:shade val="50000"/>
+            </a:schemeClr>
+          </a:lnRef>
+          <a:fillRef idx="1">
+            <a:schemeClr val="accent1"/>
+          </a:fillRef>
+          <a:effectRef idx="0">
+            <a:schemeClr val="accent1"/>
+          </a:effectRef>
+          <a:fontRef idx="minor">
+            <a:schemeClr val="lt1"/>
+          </a:fontRef>
+        </p:style>
+        <p:txBody>
+          <a:bodyPr rtlCol="0" anchor="ctr"/>
+          <a:lstStyle/>
+          <a:p>
+            <a:pPr algn="ctr"/>
+            <a:r>
+              <a:rPr lang="en-IN" dirty="0" smtClean="0">
+                <a:solidFill>
+                  <a:srgbClr val="C00000"/>
+                </a:solidFill>
+              </a:rPr>
+              <a:t>Data frame</a:t>
+            </a:r>
+          </a:p>
+          <a:p>
+            <a:pPr algn="ctr"/>
+            <a:r>
+              <a:rPr lang="en-IN" dirty="0" smtClean="0">
+                <a:solidFill>
+                  <a:srgbClr val="C00000"/>
+                </a:solidFill>
+              </a:rPr>
+              <a:t>First level</a:t>
+            </a:r>
+          </a:p>
+          <a:p>
+            <a:pPr algn="ctr"/>
+            <a:r>
+              <a:rPr lang="en-IN" sz="1600" dirty="0" smtClean="0">
+                <a:solidFill>
+                  <a:srgbClr val="C00000"/>
+                </a:solidFill>
+              </a:rPr>
+              <a:t>output</a:t>
+            </a:r>
+            <a:endParaRPr lang="en-IN" sz="1600" dirty="0">
+              <a:solidFill>
+                <a:srgbClr val="C00000"/>
+              </a:solidFill>
+            </a:endParaRPr>
+          </a:p>
+        </p:txBody>
+      </p:sp>
+      <p:sp>
+        <p:nvSpPr>
+          <p:cNvPr id="25" name="Rectangle 24"/>
+          <p:cNvSpPr/>
+          <p:nvPr/>
+        </p:nvSpPr>
+        <p:spPr>
+          <a:xfrm>
+            <a:off x="7001125" y="1110685"/>
+            <a:ext cx="1339273" cy="477973"/>
+          </a:xfrm>
+          <a:prstGeom prst="rect">
+            <a:avLst/>
+          </a:prstGeom>
+        </p:spPr>
+        <p:style>
+          <a:lnRef idx="2">
+            <a:schemeClr val="accent1">
+              <a:shade val="50000"/>
+            </a:schemeClr>
+          </a:lnRef>
+          <a:fillRef idx="1">
+            <a:schemeClr val="accent1"/>
+          </a:fillRef>
+          <a:effectRef idx="0">
+            <a:schemeClr val="accent1"/>
+          </a:effectRef>
+          <a:fontRef idx="minor">
+            <a:schemeClr val="lt1"/>
+          </a:fontRef>
+        </p:style>
+        <p:txBody>
+          <a:bodyPr rtlCol="0" anchor="ctr"/>
+          <a:lstStyle/>
+          <a:p>
+            <a:pPr algn="ctr"/>
+            <a:r>
+              <a:rPr lang="en-IN" dirty="0" smtClean="0">
+                <a:solidFill>
+                  <a:srgbClr val="C00000"/>
+                </a:solidFill>
+              </a:rPr>
+              <a:t>Train O/p</a:t>
+            </a:r>
+            <a:endParaRPr lang="en-IN" dirty="0">
+              <a:solidFill>
+                <a:srgbClr val="C00000"/>
+              </a:solidFill>
+            </a:endParaRPr>
+          </a:p>
+        </p:txBody>
+      </p:sp>
+      <p:sp>
+        <p:nvSpPr>
+          <p:cNvPr id="26" name="Rectangle 25"/>
+          <p:cNvSpPr/>
+          <p:nvPr/>
+        </p:nvSpPr>
+        <p:spPr>
+          <a:xfrm>
+            <a:off x="7001125" y="1780321"/>
+            <a:ext cx="1339273" cy="477973"/>
+          </a:xfrm>
+          <a:prstGeom prst="rect">
+            <a:avLst/>
+          </a:prstGeom>
+        </p:spPr>
+        <p:style>
+          <a:lnRef idx="2">
+            <a:schemeClr val="accent1">
+              <a:shade val="50000"/>
+            </a:schemeClr>
+          </a:lnRef>
+          <a:fillRef idx="1">
+            <a:schemeClr val="accent1"/>
+          </a:fillRef>
+          <a:effectRef idx="0">
+            <a:schemeClr val="accent1"/>
+          </a:effectRef>
+          <a:fontRef idx="minor">
+            <a:schemeClr val="lt1"/>
+          </a:fontRef>
+        </p:style>
+        <p:txBody>
+          <a:bodyPr rtlCol="0" anchor="ctr"/>
+          <a:lstStyle/>
+          <a:p>
+            <a:pPr algn="ctr"/>
+            <a:r>
+              <a:rPr lang="en-IN" dirty="0" smtClean="0">
+                <a:solidFill>
+                  <a:srgbClr val="C00000"/>
+                </a:solidFill>
+              </a:rPr>
+              <a:t>Train O/p</a:t>
+            </a:r>
+            <a:endParaRPr lang="en-IN" dirty="0">
+              <a:solidFill>
+                <a:srgbClr val="C00000"/>
+              </a:solidFill>
+            </a:endParaRPr>
+          </a:p>
+        </p:txBody>
+      </p:sp>
+      <p:sp>
+        <p:nvSpPr>
+          <p:cNvPr id="27" name="Rectangle 26"/>
+          <p:cNvSpPr/>
+          <p:nvPr/>
+        </p:nvSpPr>
+        <p:spPr>
+          <a:xfrm>
+            <a:off x="7001125" y="2444246"/>
+            <a:ext cx="1339273" cy="477973"/>
+          </a:xfrm>
+          <a:prstGeom prst="rect">
+            <a:avLst/>
+          </a:prstGeom>
+        </p:spPr>
+        <p:style>
+          <a:lnRef idx="2">
+            <a:schemeClr val="accent1">
+              <a:shade val="50000"/>
+            </a:schemeClr>
+          </a:lnRef>
+          <a:fillRef idx="1">
+            <a:schemeClr val="accent1"/>
+          </a:fillRef>
+          <a:effectRef idx="0">
+            <a:schemeClr val="accent1"/>
+          </a:effectRef>
+          <a:fontRef idx="minor">
+            <a:schemeClr val="lt1"/>
+          </a:fontRef>
+        </p:style>
+        <p:txBody>
+          <a:bodyPr rtlCol="0" anchor="ctr"/>
+          <a:lstStyle/>
+          <a:p>
+            <a:pPr algn="ctr"/>
+            <a:r>
+              <a:rPr lang="en-IN" dirty="0" smtClean="0">
+                <a:solidFill>
+                  <a:srgbClr val="C00000"/>
+                </a:solidFill>
+              </a:rPr>
+              <a:t>Train O/p</a:t>
+            </a:r>
+            <a:endParaRPr lang="en-IN" dirty="0">
+              <a:solidFill>
+                <a:srgbClr val="C00000"/>
+              </a:solidFill>
+            </a:endParaRPr>
+          </a:p>
+        </p:txBody>
+      </p:sp>
+      <p:sp>
+        <p:nvSpPr>
+          <p:cNvPr id="28" name="Bent-Up Arrow 27"/>
+          <p:cNvSpPr/>
+          <p:nvPr/>
+        </p:nvSpPr>
+        <p:spPr>
+          <a:xfrm>
+            <a:off x="2724670" y="3521948"/>
+            <a:ext cx="1256116" cy="836453"/>
+          </a:xfrm>
+          <a:prstGeom prst="bentUpArrow">
+            <a:avLst/>
+          </a:prstGeom>
+        </p:spPr>
+        <p:style>
+          <a:lnRef idx="2">
+            <a:schemeClr val="accent1">
+              <a:shade val="50000"/>
+            </a:schemeClr>
+          </a:lnRef>
+          <a:fillRef idx="1">
+            <a:schemeClr val="accent1"/>
+          </a:fillRef>
+          <a:effectRef idx="0">
+            <a:schemeClr val="accent1"/>
+          </a:effectRef>
+          <a:fontRef idx="minor">
+            <a:schemeClr val="lt1"/>
+          </a:fontRef>
+        </p:style>
+        <p:txBody>
+          <a:bodyPr rtlCol="0" anchor="ctr"/>
+          <a:lstStyle/>
+          <a:p>
+            <a:pPr algn="ctr"/>
+            <a:endParaRPr lang="en-IN"/>
+          </a:p>
+        </p:txBody>
+      </p:sp>
+      <p:sp>
+        <p:nvSpPr>
+          <p:cNvPr id="29" name="Rectangle 28"/>
+          <p:cNvSpPr/>
+          <p:nvPr/>
+        </p:nvSpPr>
+        <p:spPr>
+          <a:xfrm>
+            <a:off x="7001125" y="3015722"/>
+            <a:ext cx="1339273" cy="477973"/>
+          </a:xfrm>
+          <a:prstGeom prst="rect">
+            <a:avLst/>
+          </a:prstGeom>
+        </p:spPr>
+        <p:style>
+          <a:lnRef idx="2">
+            <a:schemeClr val="accent1">
+              <a:shade val="50000"/>
+            </a:schemeClr>
+          </a:lnRef>
+          <a:fillRef idx="1">
+            <a:schemeClr val="accent1"/>
+          </a:fillRef>
+          <a:effectRef idx="0">
+            <a:schemeClr val="accent1"/>
+          </a:effectRef>
+          <a:fontRef idx="minor">
+            <a:schemeClr val="lt1"/>
+          </a:fontRef>
+        </p:style>
+        <p:txBody>
+          <a:bodyPr rtlCol="0" anchor="ctr"/>
+          <a:lstStyle/>
+          <a:p>
+            <a:pPr algn="ctr"/>
+            <a:r>
+              <a:rPr lang="en-IN" dirty="0" smtClean="0">
+                <a:solidFill>
+                  <a:srgbClr val="C00000"/>
+                </a:solidFill>
+              </a:rPr>
+              <a:t>Train O/p</a:t>
+            </a:r>
+            <a:endParaRPr lang="en-IN" dirty="0">
+              <a:solidFill>
+                <a:srgbClr val="C00000"/>
+              </a:solidFill>
+            </a:endParaRPr>
+          </a:p>
+        </p:txBody>
+      </p:sp>
+      <p:sp>
+        <p:nvSpPr>
+          <p:cNvPr id="30" name="Right Arrow 29"/>
+          <p:cNvSpPr/>
+          <p:nvPr/>
+        </p:nvSpPr>
+        <p:spPr>
+          <a:xfrm>
+            <a:off x="6668616" y="1110685"/>
+            <a:ext cx="332509" cy="477973"/>
+          </a:xfrm>
+          <a:prstGeom prst="rightArrow">
+            <a:avLst/>
+          </a:prstGeom>
+        </p:spPr>
+        <p:style>
+          <a:lnRef idx="2">
+            <a:schemeClr val="accent1">
+              <a:shade val="50000"/>
+            </a:schemeClr>
+          </a:lnRef>
+          <a:fillRef idx="1">
+            <a:schemeClr val="accent1"/>
+          </a:fillRef>
+          <a:effectRef idx="0">
+            <a:schemeClr val="accent1"/>
+          </a:effectRef>
+          <a:fontRef idx="minor">
+            <a:schemeClr val="lt1"/>
+          </a:fontRef>
+        </p:style>
+        <p:txBody>
+          <a:bodyPr rtlCol="0" anchor="ctr"/>
+          <a:lstStyle/>
+          <a:p>
+            <a:pPr algn="ctr"/>
+            <a:endParaRPr lang="en-IN"/>
+          </a:p>
+        </p:txBody>
+      </p:sp>
+      <p:sp>
+        <p:nvSpPr>
+          <p:cNvPr id="31" name="Right Arrow 30"/>
+          <p:cNvSpPr/>
+          <p:nvPr/>
+        </p:nvSpPr>
+        <p:spPr>
+          <a:xfrm>
+            <a:off x="6668616" y="1791874"/>
+            <a:ext cx="332509" cy="429487"/>
+          </a:xfrm>
+          <a:prstGeom prst="rightArrow">
+            <a:avLst/>
+          </a:prstGeom>
+        </p:spPr>
+        <p:style>
+          <a:lnRef idx="2">
+            <a:schemeClr val="accent1">
+              <a:shade val="50000"/>
+            </a:schemeClr>
+          </a:lnRef>
+          <a:fillRef idx="1">
+            <a:schemeClr val="accent1"/>
+          </a:fillRef>
+          <a:effectRef idx="0">
+            <a:schemeClr val="accent1"/>
+          </a:effectRef>
+          <a:fontRef idx="minor">
+            <a:schemeClr val="lt1"/>
+          </a:fontRef>
+        </p:style>
+        <p:txBody>
+          <a:bodyPr rtlCol="0" anchor="ctr"/>
+          <a:lstStyle/>
+          <a:p>
+            <a:pPr algn="ctr"/>
+            <a:endParaRPr lang="en-IN"/>
+          </a:p>
+        </p:txBody>
+      </p:sp>
+      <p:sp>
+        <p:nvSpPr>
+          <p:cNvPr id="32" name="Right Arrow 31"/>
+          <p:cNvSpPr/>
+          <p:nvPr/>
+        </p:nvSpPr>
+        <p:spPr>
+          <a:xfrm>
+            <a:off x="6668616" y="2444246"/>
+            <a:ext cx="332509" cy="477973"/>
+          </a:xfrm>
+          <a:prstGeom prst="rightArrow">
+            <a:avLst/>
+          </a:prstGeom>
+        </p:spPr>
+        <p:style>
+          <a:lnRef idx="2">
+            <a:schemeClr val="accent1">
+              <a:shade val="50000"/>
+            </a:schemeClr>
+          </a:lnRef>
+          <a:fillRef idx="1">
+            <a:schemeClr val="accent1"/>
+          </a:fillRef>
+          <a:effectRef idx="0">
+            <a:schemeClr val="accent1"/>
+          </a:effectRef>
+          <a:fontRef idx="minor">
+            <a:schemeClr val="lt1"/>
+          </a:fontRef>
+        </p:style>
+        <p:txBody>
+          <a:bodyPr rtlCol="0" anchor="ctr"/>
+          <a:lstStyle/>
+          <a:p>
+            <a:pPr algn="ctr"/>
+            <a:endParaRPr lang="en-IN"/>
+          </a:p>
+        </p:txBody>
+      </p:sp>
+      <p:sp>
+        <p:nvSpPr>
+          <p:cNvPr id="33" name="Right Arrow 32"/>
+          <p:cNvSpPr/>
+          <p:nvPr/>
+        </p:nvSpPr>
+        <p:spPr>
+          <a:xfrm>
+            <a:off x="6668616" y="3008502"/>
+            <a:ext cx="332509" cy="512872"/>
+          </a:xfrm>
+          <a:prstGeom prst="rightArrow">
+            <a:avLst/>
+          </a:prstGeom>
+        </p:spPr>
+        <p:style>
+          <a:lnRef idx="2">
+            <a:schemeClr val="accent1">
+              <a:shade val="50000"/>
+            </a:schemeClr>
+          </a:lnRef>
+          <a:fillRef idx="1">
+            <a:schemeClr val="accent1"/>
+          </a:fillRef>
+          <a:effectRef idx="0">
+            <a:schemeClr val="accent1"/>
+          </a:effectRef>
+          <a:fontRef idx="minor">
+            <a:schemeClr val="lt1"/>
+          </a:fontRef>
+        </p:style>
+        <p:txBody>
+          <a:bodyPr rtlCol="0" anchor="ctr"/>
+          <a:lstStyle/>
+          <a:p>
+            <a:pPr algn="ctr"/>
+            <a:endParaRPr lang="en-IN"/>
+          </a:p>
+        </p:txBody>
+      </p:sp>
+      <p:sp>
+        <p:nvSpPr>
+          <p:cNvPr id="36" name="Right Arrow Callout 35"/>
+          <p:cNvSpPr/>
+          <p:nvPr/>
+        </p:nvSpPr>
+        <p:spPr>
+          <a:xfrm>
+            <a:off x="8478938" y="992908"/>
+            <a:ext cx="637310" cy="2648534"/>
+          </a:xfrm>
+          <a:prstGeom prst="rightArrowCallout">
+            <a:avLst/>
+          </a:prstGeom>
+        </p:spPr>
+        <p:style>
+          <a:lnRef idx="2">
+            <a:schemeClr val="accent1">
+              <a:shade val="50000"/>
+            </a:schemeClr>
+          </a:lnRef>
+          <a:fillRef idx="1">
+            <a:schemeClr val="accent1"/>
+          </a:fillRef>
+          <a:effectRef idx="0">
+            <a:schemeClr val="accent1"/>
+          </a:effectRef>
+          <a:fontRef idx="minor">
+            <a:schemeClr val="lt1"/>
+          </a:fontRef>
+        </p:style>
+        <p:txBody>
+          <a:bodyPr vert="wordArtVert" rtlCol="0" anchor="ctr"/>
+          <a:lstStyle/>
+          <a:p>
+            <a:pPr algn="ctr"/>
+            <a:r>
+              <a:rPr lang="en-IN" dirty="0" smtClean="0">
+                <a:solidFill>
+                  <a:srgbClr val="C00000"/>
+                </a:solidFill>
+              </a:rPr>
+              <a:t>combine</a:t>
+            </a:r>
+            <a:endParaRPr lang="en-IN" dirty="0">
+              <a:solidFill>
+                <a:srgbClr val="C00000"/>
+              </a:solidFill>
+            </a:endParaRPr>
+          </a:p>
+        </p:txBody>
+      </p:sp>
+      <p:sp>
+        <p:nvSpPr>
+          <p:cNvPr id="38" name="Rectangle 37"/>
+          <p:cNvSpPr/>
+          <p:nvPr/>
+        </p:nvSpPr>
+        <p:spPr>
+          <a:xfrm>
+            <a:off x="8478938" y="4413817"/>
+            <a:ext cx="2794042" cy="610763"/>
+          </a:xfrm>
+          <a:prstGeom prst="rect">
+            <a:avLst/>
+          </a:prstGeom>
+        </p:spPr>
+        <p:style>
+          <a:lnRef idx="2">
+            <a:schemeClr val="accent1">
+              <a:shade val="50000"/>
+            </a:schemeClr>
+          </a:lnRef>
+          <a:fillRef idx="1">
+            <a:schemeClr val="accent1"/>
+          </a:fillRef>
+          <a:effectRef idx="0">
+            <a:schemeClr val="accent1"/>
+          </a:effectRef>
+          <a:fontRef idx="minor">
+            <a:schemeClr val="lt1"/>
+          </a:fontRef>
+        </p:style>
+        <p:txBody>
+          <a:bodyPr rtlCol="0" anchor="ctr"/>
+          <a:lstStyle/>
+          <a:p>
+            <a:pPr algn="ctr"/>
+            <a:r>
+              <a:rPr lang="en-IN" dirty="0" smtClean="0">
+                <a:solidFill>
+                  <a:srgbClr val="C00000"/>
+                </a:solidFill>
+              </a:rPr>
+              <a:t>XGBoost Regression (meta-model)</a:t>
+            </a:r>
+            <a:endParaRPr lang="en-IN" dirty="0">
+              <a:solidFill>
+                <a:srgbClr val="C00000"/>
+              </a:solidFill>
+            </a:endParaRPr>
+          </a:p>
+        </p:txBody>
+      </p:sp>
+      <p:sp>
+        <p:nvSpPr>
+          <p:cNvPr id="39" name="Down Arrow 38"/>
+          <p:cNvSpPr/>
+          <p:nvPr/>
+        </p:nvSpPr>
+        <p:spPr>
+          <a:xfrm>
+            <a:off x="8802223" y="3539846"/>
+            <a:ext cx="1625644" cy="846263"/>
+          </a:xfrm>
+          <a:prstGeom prst="downArrow">
+            <a:avLst/>
+          </a:prstGeom>
+        </p:spPr>
+        <p:style>
+          <a:lnRef idx="2">
+            <a:schemeClr val="accent1">
+              <a:shade val="50000"/>
+            </a:schemeClr>
+          </a:lnRef>
+          <a:fillRef idx="1">
+            <a:schemeClr val="accent1"/>
+          </a:fillRef>
+          <a:effectRef idx="0">
+            <a:schemeClr val="accent1"/>
+          </a:effectRef>
+          <a:fontRef idx="minor">
+            <a:schemeClr val="lt1"/>
+          </a:fontRef>
+        </p:style>
+        <p:txBody>
+          <a:bodyPr rtlCol="0" anchor="ctr"/>
+          <a:lstStyle/>
+          <a:p>
+            <a:pPr algn="ctr"/>
+            <a:r>
+              <a:rPr lang="en-IN" dirty="0" smtClean="0"/>
+              <a:t>Train I/p</a:t>
+            </a:r>
+            <a:endParaRPr lang="en-IN" dirty="0"/>
+          </a:p>
+        </p:txBody>
+      </p:sp>
+      <p:sp>
+        <p:nvSpPr>
+          <p:cNvPr id="40" name="Rectangle 39"/>
+          <p:cNvSpPr/>
+          <p:nvPr/>
+        </p:nvSpPr>
+        <p:spPr>
+          <a:xfrm>
+            <a:off x="5985128" y="3880428"/>
+            <a:ext cx="2189019" cy="477973"/>
+          </a:xfrm>
+          <a:prstGeom prst="rect">
+            <a:avLst/>
+          </a:prstGeom>
+        </p:spPr>
+        <p:style>
+          <a:lnRef idx="2">
+            <a:schemeClr val="accent1">
+              <a:shade val="50000"/>
+            </a:schemeClr>
+          </a:lnRef>
+          <a:fillRef idx="1">
+            <a:schemeClr val="accent1"/>
+          </a:fillRef>
+          <a:effectRef idx="0">
+            <a:schemeClr val="accent1"/>
+          </a:effectRef>
+          <a:fontRef idx="minor">
+            <a:schemeClr val="lt1"/>
+          </a:fontRef>
+        </p:style>
+        <p:txBody>
+          <a:bodyPr rtlCol="0" anchor="ctr"/>
+          <a:lstStyle/>
+          <a:p>
+            <a:pPr algn="ctr"/>
+            <a:r>
+              <a:rPr lang="en-IN" dirty="0" smtClean="0">
+                <a:solidFill>
+                  <a:srgbClr val="C00000"/>
+                </a:solidFill>
+              </a:rPr>
+              <a:t>Test data O/p</a:t>
+            </a:r>
+            <a:endParaRPr lang="en-IN" dirty="0">
+              <a:solidFill>
+                <a:srgbClr val="C00000"/>
+              </a:solidFill>
+            </a:endParaRPr>
+          </a:p>
+        </p:txBody>
+      </p:sp>
+      <p:sp>
+        <p:nvSpPr>
+          <p:cNvPr id="41" name="Down Arrow 40"/>
+          <p:cNvSpPr/>
+          <p:nvPr/>
+        </p:nvSpPr>
+        <p:spPr>
+          <a:xfrm>
+            <a:off x="5985129" y="3539846"/>
+            <a:ext cx="489528" cy="340582"/>
+          </a:xfrm>
+          <a:prstGeom prst="downArrow">
+            <a:avLst/>
+          </a:prstGeom>
+        </p:spPr>
+        <p:style>
+          <a:lnRef idx="2">
+            <a:schemeClr val="accent1">
+              <a:shade val="50000"/>
+            </a:schemeClr>
+          </a:lnRef>
+          <a:fillRef idx="1">
+            <a:schemeClr val="accent1"/>
+          </a:fillRef>
+          <a:effectRef idx="0">
+            <a:schemeClr val="accent1"/>
+          </a:effectRef>
+          <a:fontRef idx="minor">
+            <a:schemeClr val="lt1"/>
+          </a:fontRef>
+        </p:style>
+        <p:txBody>
+          <a:bodyPr rtlCol="0" anchor="ctr"/>
+          <a:lstStyle/>
+          <a:p>
+            <a:pPr algn="ctr"/>
+            <a:endParaRPr lang="en-IN"/>
+          </a:p>
+        </p:txBody>
+      </p:sp>
+      <p:sp>
+        <p:nvSpPr>
+          <p:cNvPr id="44" name="Bent-Up Arrow 43"/>
+          <p:cNvSpPr/>
+          <p:nvPr/>
+        </p:nvSpPr>
+        <p:spPr>
+          <a:xfrm rot="5400000">
+            <a:off x="7435113" y="3980755"/>
+            <a:ext cx="649912" cy="1437738"/>
+          </a:xfrm>
+          <a:prstGeom prst="bentUpArrow">
+            <a:avLst>
+              <a:gd name="adj1" fmla="val 25000"/>
+              <a:gd name="adj2" fmla="val 23344"/>
+              <a:gd name="adj3" fmla="val 25000"/>
+            </a:avLst>
+          </a:prstGeom>
+        </p:spPr>
+        <p:style>
+          <a:lnRef idx="2">
+            <a:schemeClr val="accent1">
+              <a:shade val="50000"/>
+            </a:schemeClr>
+          </a:lnRef>
+          <a:fillRef idx="1">
+            <a:schemeClr val="accent1"/>
+          </a:fillRef>
+          <a:effectRef idx="0">
+            <a:schemeClr val="accent1"/>
+          </a:effectRef>
+          <a:fontRef idx="minor">
+            <a:schemeClr val="lt1"/>
+          </a:fontRef>
+        </p:style>
+        <p:txBody>
+          <a:bodyPr vert="vert270" rtlCol="0" anchor="ctr"/>
+          <a:lstStyle/>
+          <a:p>
+            <a:pPr algn="ctr"/>
+            <a:endParaRPr lang="en-IN" dirty="0"/>
+          </a:p>
+        </p:txBody>
+      </p:sp>
+      <p:sp>
+        <p:nvSpPr>
+          <p:cNvPr id="45" name="TextBox 44"/>
+          <p:cNvSpPr txBox="1"/>
+          <p:nvPr/>
+        </p:nvSpPr>
+        <p:spPr>
+          <a:xfrm>
+            <a:off x="7001125" y="5024580"/>
+            <a:ext cx="1477813" cy="369332"/>
+          </a:xfrm>
+          <a:prstGeom prst="rect">
+            <a:avLst/>
+          </a:prstGeom>
+          <a:noFill/>
+        </p:spPr>
+        <p:txBody>
+          <a:bodyPr wrap="square" rtlCol="0">
+            <a:spAutoFit/>
+          </a:bodyPr>
+          <a:lstStyle/>
+          <a:p>
+            <a:r>
+              <a:rPr lang="en-IN" dirty="0" smtClean="0"/>
+              <a:t>Test I/p</a:t>
+            </a:r>
+            <a:endParaRPr lang="en-IN" dirty="0"/>
+          </a:p>
+        </p:txBody>
+      </p:sp>
+      <p:sp>
+        <p:nvSpPr>
+          <p:cNvPr id="47" name="Rectangle 46"/>
+          <p:cNvSpPr/>
+          <p:nvPr/>
+        </p:nvSpPr>
+        <p:spPr>
+          <a:xfrm>
+            <a:off x="8492798" y="5393912"/>
+            <a:ext cx="1339273" cy="477973"/>
+          </a:xfrm>
+          <a:prstGeom prst="rect">
+            <a:avLst/>
+          </a:prstGeom>
+        </p:spPr>
+        <p:style>
+          <a:lnRef idx="2">
+            <a:schemeClr val="accent1">
+              <a:shade val="50000"/>
+            </a:schemeClr>
+          </a:lnRef>
+          <a:fillRef idx="1">
+            <a:schemeClr val="accent1"/>
+          </a:fillRef>
+          <a:effectRef idx="0">
+            <a:schemeClr val="accent1"/>
+          </a:effectRef>
+          <a:fontRef idx="minor">
+            <a:schemeClr val="lt1"/>
+          </a:fontRef>
+        </p:style>
+        <p:txBody>
+          <a:bodyPr rtlCol="0" anchor="ctr"/>
+          <a:lstStyle/>
+          <a:p>
+            <a:pPr algn="ctr"/>
+            <a:r>
+              <a:rPr lang="en-IN" dirty="0" smtClean="0">
+                <a:solidFill>
+                  <a:srgbClr val="C00000"/>
+                </a:solidFill>
+              </a:rPr>
+              <a:t>Train O/p</a:t>
+            </a:r>
+            <a:endParaRPr lang="en-IN" dirty="0">
+              <a:solidFill>
+                <a:srgbClr val="C00000"/>
+              </a:solidFill>
+            </a:endParaRPr>
+          </a:p>
+        </p:txBody>
+      </p:sp>
+      <p:sp>
+        <p:nvSpPr>
+          <p:cNvPr id="48" name="Rectangle 47"/>
+          <p:cNvSpPr/>
+          <p:nvPr/>
+        </p:nvSpPr>
+        <p:spPr>
+          <a:xfrm>
+            <a:off x="10002981" y="5393912"/>
+            <a:ext cx="1269999" cy="477973"/>
+          </a:xfrm>
+          <a:prstGeom prst="rect">
+            <a:avLst/>
+          </a:prstGeom>
+        </p:spPr>
+        <p:style>
+          <a:lnRef idx="2">
+            <a:schemeClr val="accent1">
+              <a:shade val="50000"/>
+            </a:schemeClr>
+          </a:lnRef>
+          <a:fillRef idx="1">
+            <a:schemeClr val="accent1"/>
+          </a:fillRef>
+          <a:effectRef idx="0">
+            <a:schemeClr val="accent1"/>
+          </a:effectRef>
+          <a:fontRef idx="minor">
+            <a:schemeClr val="lt1"/>
+          </a:fontRef>
+        </p:style>
+        <p:txBody>
+          <a:bodyPr rtlCol="0" anchor="ctr"/>
+          <a:lstStyle/>
+          <a:p>
+            <a:pPr algn="ctr"/>
+            <a:r>
+              <a:rPr lang="en-IN" dirty="0" smtClean="0">
+                <a:solidFill>
+                  <a:srgbClr val="C00000"/>
+                </a:solidFill>
+              </a:rPr>
+              <a:t>Test O/p</a:t>
+            </a:r>
+            <a:endParaRPr lang="en-IN" dirty="0">
+              <a:solidFill>
+                <a:srgbClr val="C00000"/>
+              </a:solidFill>
+            </a:endParaRPr>
+          </a:p>
+        </p:txBody>
+      </p:sp>
+      <p:sp>
+        <p:nvSpPr>
+          <p:cNvPr id="49" name="Down Arrow 48"/>
+          <p:cNvSpPr/>
+          <p:nvPr/>
+        </p:nvSpPr>
+        <p:spPr>
+          <a:xfrm>
+            <a:off x="8802224" y="5024580"/>
+            <a:ext cx="729704" cy="369332"/>
+          </a:xfrm>
+          <a:prstGeom prst="downArrow">
+            <a:avLst/>
+          </a:prstGeom>
+        </p:spPr>
+        <p:style>
+          <a:lnRef idx="2">
+            <a:schemeClr val="accent1">
+              <a:shade val="50000"/>
+            </a:schemeClr>
+          </a:lnRef>
+          <a:fillRef idx="1">
+            <a:schemeClr val="accent1"/>
+          </a:fillRef>
+          <a:effectRef idx="0">
+            <a:schemeClr val="accent1"/>
+          </a:effectRef>
+          <a:fontRef idx="minor">
+            <a:schemeClr val="lt1"/>
+          </a:fontRef>
+        </p:style>
+        <p:txBody>
+          <a:bodyPr rtlCol="0" anchor="ctr"/>
+          <a:lstStyle/>
+          <a:p>
+            <a:pPr algn="ctr"/>
+            <a:endParaRPr lang="en-IN"/>
+          </a:p>
+        </p:txBody>
+      </p:sp>
+      <p:sp>
+        <p:nvSpPr>
+          <p:cNvPr id="50" name="Down Arrow 49"/>
+          <p:cNvSpPr/>
+          <p:nvPr/>
+        </p:nvSpPr>
+        <p:spPr>
+          <a:xfrm>
+            <a:off x="10427867" y="5024580"/>
+            <a:ext cx="581878" cy="369332"/>
+          </a:xfrm>
+          <a:prstGeom prst="downArrow">
+            <a:avLst/>
+          </a:prstGeom>
+        </p:spPr>
+        <p:style>
+          <a:lnRef idx="2">
+            <a:schemeClr val="accent1">
+              <a:shade val="50000"/>
+            </a:schemeClr>
+          </a:lnRef>
+          <a:fillRef idx="1">
+            <a:schemeClr val="accent1"/>
+          </a:fillRef>
+          <a:effectRef idx="0">
+            <a:schemeClr val="accent1"/>
+          </a:effectRef>
+          <a:fontRef idx="minor">
+            <a:schemeClr val="lt1"/>
+          </a:fontRef>
+        </p:style>
+        <p:txBody>
+          <a:bodyPr rtlCol="0" anchor="ctr"/>
+          <a:lstStyle/>
+          <a:p>
+            <a:pPr algn="ctr"/>
+            <a:endParaRPr lang="en-IN"/>
+          </a:p>
+        </p:txBody>
+      </p:sp>
+      <p:pic>
+        <p:nvPicPr>
+          <p:cNvPr id="51" name="image16.png"/>
+          <p:cNvPicPr/>
+          <p:nvPr/>
+        </p:nvPicPr>
+        <p:blipFill>
+          <a:blip r:embed="rId2"/>
+          <a:srcRect/>
+          <a:stretch>
+            <a:fillRect/>
+          </a:stretch>
+        </p:blipFill>
+        <p:spPr>
+          <a:xfrm>
+            <a:off x="0" y="5024580"/>
+            <a:ext cx="4313382" cy="1851755"/>
+          </a:xfrm>
+          <a:prstGeom prst="rect">
+            <a:avLst/>
+          </a:prstGeom>
+          <a:ln/>
+        </p:spPr>
+      </p:pic>
+      <p:pic>
+        <p:nvPicPr>
+          <p:cNvPr id="1026" name="Picture 2"/>
+          <p:cNvPicPr>
+            <a:picLocks noChangeAspect="1" noChangeArrowheads="1"/>
+          </p:cNvPicPr>
+          <p:nvPr/>
+        </p:nvPicPr>
+        <p:blipFill>
+          <a:blip r:embed="rId3"/>
+          <a:srcRect/>
+          <a:stretch>
+            <a:fillRect/>
+          </a:stretch>
+        </p:blipFill>
+        <p:spPr bwMode="auto">
+          <a:xfrm>
+            <a:off x="4585815" y="5479044"/>
+            <a:ext cx="3426691" cy="1397291"/>
+          </a:xfrm>
+          <a:prstGeom prst="rect">
+            <a:avLst/>
+          </a:prstGeom>
+          <a:noFill/>
+          <a:ln w="9525">
+            <a:noFill/>
+            <a:miter lim="800000"/>
+            <a:headEnd/>
+            <a:tailEnd/>
+          </a:ln>
+          <a:effectLst/>
+        </p:spPr>
+      </p:pic>
     </p:spTree>
   </p:cSld>
   <p:clrMapOvr>
     <a:masterClrMapping/>
   </p:clrMapOvr>
+  <p:timing>
+    <p:tnLst>
+      <p:par>
+        <p:cTn id="1" dur="indefinite" restart="never" nodeType="tmRoot"/>
+      </p:par>
+    </p:tnLst>
+  </p:timing>
 </p:sld>
 </file>
 
@@ -9549,47 +11177,10 @@
       </p:grpSpPr>
       <p:sp>
         <p:nvSpPr>
-          <p:cNvPr id="2" name="Title 1">
-            <a:extLst>
-              <a:ext uri="{FF2B5EF4-FFF2-40B4-BE49-F238E27FC236}">
-                <a16:creationId xmlns:a16="http://schemas.microsoft.com/office/drawing/2014/main" xmlns="" id="{7F0BD05E-A7CD-2045-8213-AC58A5086B53}"/>
-              </a:ext>
-            </a:extLst>
-          </p:cNvPr>
-          <p:cNvSpPr>
-            <a:spLocks noGrp="1"/>
-          </p:cNvSpPr>
-          <p:nvPr>
-            <p:ph type="title"/>
-          </p:nvPr>
-        </p:nvSpPr>
-        <p:spPr/>
-        <p:txBody>
-          <a:bodyPr>
-            <a:normAutofit fontScale="90000"/>
-          </a:bodyPr>
-          <a:lstStyle/>
-          <a:p>
-            <a:r>
-              <a:rPr lang="en-US" dirty="0"/>
-              <a:t> </a:t>
-            </a:r>
-            <a:br>
-              <a:rPr lang="en-US" dirty="0"/>
-            </a:br>
-            <a:r>
-              <a:rPr lang="en-US" dirty="0"/>
-              <a:t>Conclusion</a:t>
-            </a:r>
-          </a:p>
-        </p:txBody>
-      </p:sp>
-      <p:sp>
-        <p:nvSpPr>
           <p:cNvPr id="4" name="Slide Number Placeholder 3">
             <a:extLst>
               <a:ext uri="{FF2B5EF4-FFF2-40B4-BE49-F238E27FC236}">
-                <a16:creationId xmlns:a16="http://schemas.microsoft.com/office/drawing/2014/main" xmlns="" id="{FEEB83DB-1C2B-874D-8FAE-99B4C4569E73}"/>
+                <a16:creationId xmlns="" xmlns:a16="http://schemas.microsoft.com/office/drawing/2014/main" id="{FEEB83DB-1C2B-874D-8FAE-99B4C4569E73}"/>
               </a:ext>
             </a:extLst>
           </p:cNvPr>
@@ -9614,35 +11205,492 @@
           </a:p>
         </p:txBody>
       </p:sp>
-      <p:sp>
-        <p:nvSpPr>
-          <p:cNvPr id="5" name="Content Placeholder 4"/>
-          <p:cNvSpPr>
-            <a:spLocks noGrp="1"/>
-          </p:cNvSpPr>
-          <p:nvPr>
-            <p:ph idx="1"/>
-          </p:nvPr>
-        </p:nvSpPr>
-        <p:spPr/>
-        <p:txBody>
-          <a:bodyPr/>
+      <p:pic>
+        <p:nvPicPr>
+          <p:cNvPr id="6" name="image20.png"/>
+          <p:cNvPicPr/>
+          <p:nvPr/>
+        </p:nvPicPr>
+        <p:blipFill>
+          <a:blip r:embed="rId2"/>
+          <a:srcRect/>
+          <a:stretch>
+            <a:fillRect/>
+          </a:stretch>
+        </p:blipFill>
+        <p:spPr>
+          <a:xfrm>
+            <a:off x="152977" y="3968383"/>
+            <a:ext cx="5981700" cy="2586038"/>
+          </a:xfrm>
+          <a:prstGeom prst="rect">
+            <a:avLst/>
+          </a:prstGeom>
+          <a:ln/>
+        </p:spPr>
+      </p:pic>
+      <p:pic>
+        <p:nvPicPr>
+          <p:cNvPr id="7" name="image19.png"/>
+          <p:cNvPicPr/>
+          <p:nvPr/>
+        </p:nvPicPr>
+        <p:blipFill>
+          <a:blip r:embed="rId3"/>
+          <a:srcRect/>
+          <a:stretch>
+            <a:fillRect/>
+          </a:stretch>
+        </p:blipFill>
+        <p:spPr>
+          <a:xfrm>
+            <a:off x="6300932" y="3968383"/>
+            <a:ext cx="5734050" cy="2586038"/>
+          </a:xfrm>
+          <a:prstGeom prst="rect">
+            <a:avLst/>
+          </a:prstGeom>
+          <a:ln/>
+        </p:spPr>
+      </p:pic>
+      <p:sp>
+        <p:nvSpPr>
+          <p:cNvPr id="9" name="TextBox 8"/>
+          <p:cNvSpPr txBox="1"/>
+          <p:nvPr/>
+        </p:nvSpPr>
+        <p:spPr>
+          <a:xfrm>
+            <a:off x="-1" y="129304"/>
+            <a:ext cx="9125527" cy="523220"/>
+          </a:xfrm>
+          <a:prstGeom prst="rect">
+            <a:avLst/>
+          </a:prstGeom>
+          <a:noFill/>
+        </p:spPr>
+        <p:txBody>
+          <a:bodyPr wrap="square" rtlCol="0">
+            <a:spAutoFit/>
+          </a:bodyPr>
           <a:lstStyle/>
           <a:p>
-            <a:endParaRPr lang="en-IN"/>
-          </a:p>
-        </p:txBody>
-      </p:sp>
+            <a:r>
+              <a:rPr lang="en-IN" sz="2800" dirty="0" smtClean="0">
+                <a:solidFill>
+                  <a:srgbClr val="C00000"/>
+                </a:solidFill>
+              </a:rPr>
+              <a:t>Best Model </a:t>
+            </a:r>
+            <a:r>
+              <a:rPr lang="en-IN" sz="2800" dirty="0" smtClean="0">
+                <a:solidFill>
+                  <a:srgbClr val="C00000"/>
+                </a:solidFill>
+              </a:rPr>
+              <a:t>( Random Forest ) Output </a:t>
+            </a:r>
+            <a:r>
+              <a:rPr lang="en-IN" sz="2800" dirty="0" smtClean="0">
+                <a:solidFill>
+                  <a:srgbClr val="C00000"/>
+                </a:solidFill>
+              </a:rPr>
+              <a:t>prediction</a:t>
+            </a:r>
+            <a:endParaRPr lang="en-IN" sz="2800" dirty="0">
+              <a:solidFill>
+                <a:srgbClr val="C00000"/>
+              </a:solidFill>
+            </a:endParaRPr>
+          </a:p>
+        </p:txBody>
+      </p:sp>
+      <p:pic>
+        <p:nvPicPr>
+          <p:cNvPr id="2050" name="Picture 2" descr="C:\Users\Resmi\Desktop\classes\Work\myGit\Data-Science\Applied-Machine-Learning\Capstone Project\Source\Disease Reported ( Actual - preddiction) from Iquitos.png"/>
+          <p:cNvPicPr>
+            <a:picLocks noChangeAspect="1" noChangeArrowheads="1"/>
+          </p:cNvPicPr>
+          <p:nvPr/>
+        </p:nvPicPr>
+        <p:blipFill>
+          <a:blip r:embed="rId4"/>
+          <a:srcRect/>
+          <a:stretch>
+            <a:fillRect/>
+          </a:stretch>
+        </p:blipFill>
+        <p:spPr bwMode="auto">
+          <a:xfrm>
+            <a:off x="6184877" y="746124"/>
+            <a:ext cx="5724279" cy="2791403"/>
+          </a:xfrm>
+          <a:prstGeom prst="rect">
+            <a:avLst/>
+          </a:prstGeom>
+          <a:noFill/>
+        </p:spPr>
+      </p:pic>
+      <p:pic>
+        <p:nvPicPr>
+          <p:cNvPr id="2051" name="Picture 3" descr="C:\Users\Resmi\Desktop\classes\Work\myGit\Data-Science\Applied-Machine-Learning\Capstone Project\Source\Disease Reported ( Actual - preddiction) from San Juan.png"/>
+          <p:cNvPicPr>
+            <a:picLocks noChangeAspect="1" noChangeArrowheads="1"/>
+          </p:cNvPicPr>
+          <p:nvPr/>
+        </p:nvPicPr>
+        <p:blipFill>
+          <a:blip r:embed="rId5"/>
+          <a:srcRect/>
+          <a:stretch>
+            <a:fillRect/>
+          </a:stretch>
+        </p:blipFill>
+        <p:spPr bwMode="auto">
+          <a:xfrm>
+            <a:off x="152978" y="746126"/>
+            <a:ext cx="5981576" cy="2791402"/>
+          </a:xfrm>
+          <a:prstGeom prst="rect">
+            <a:avLst/>
+          </a:prstGeom>
+          <a:noFill/>
+        </p:spPr>
+      </p:pic>
     </p:spTree>
     <p:extLst>
       <p:ext uri="{BB962C8B-B14F-4D97-AF65-F5344CB8AC3E}">
-        <p14:creationId xmlns:p14="http://schemas.microsoft.com/office/powerpoint/2010/main" xmlns="" val="1517894279"/>
+        <p14:creationId xmlns="" xmlns:p14="http://schemas.microsoft.com/office/powerpoint/2010/main" val="1517894279"/>
       </p:ext>
     </p:extLst>
   </p:cSld>
   <p:clrMapOvr>
     <a:masterClrMapping/>
   </p:clrMapOvr>
+  <p:timing>
+    <p:tnLst>
+      <p:par>
+        <p:cTn id="1" dur="indefinite" restart="never" nodeType="tmRoot"/>
+      </p:par>
+    </p:tnLst>
+  </p:timing>
+</p:sld>
+</file>
+
+<file path=ppt/slides/slide8.xml><?xml version="1.0" encoding="utf-8"?>
+<p:sld xmlns:a="http://schemas.openxmlformats.org/drawingml/2006/main" xmlns:r="http://schemas.openxmlformats.org/officeDocument/2006/relationships" xmlns:p="http://schemas.openxmlformats.org/presentationml/2006/main">
+  <p:cSld>
+    <p:spTree>
+      <p:nvGrpSpPr>
+        <p:cNvPr id="1" name=""/>
+        <p:cNvGrpSpPr/>
+        <p:nvPr/>
+      </p:nvGrpSpPr>
+      <p:grpSpPr>
+        <a:xfrm>
+          <a:off x="0" y="0"/>
+          <a:ext cx="0" cy="0"/>
+          <a:chOff x="0" y="0"/>
+          <a:chExt cx="0" cy="0"/>
+        </a:xfrm>
+      </p:grpSpPr>
+      <p:sp>
+        <p:nvSpPr>
+          <p:cNvPr id="2" name="Title 1"/>
+          <p:cNvSpPr>
+            <a:spLocks noGrp="1"/>
+          </p:cNvSpPr>
+          <p:nvPr>
+            <p:ph type="title"/>
+          </p:nvPr>
+        </p:nvSpPr>
+        <p:spPr>
+          <a:xfrm>
+            <a:off x="360217" y="4286827"/>
+            <a:ext cx="10972800" cy="1143000"/>
+          </a:xfrm>
+        </p:spPr>
+        <p:txBody>
+          <a:bodyPr/>
+          <a:lstStyle/>
+          <a:p>
+            <a:r>
+              <a:rPr lang="en-IN" dirty="0" smtClean="0"/>
+              <a:t>Questions </a:t>
+            </a:r>
+            <a:endParaRPr lang="en-IN" dirty="0"/>
+          </a:p>
+        </p:txBody>
+      </p:sp>
+      <p:sp>
+        <p:nvSpPr>
+          <p:cNvPr id="4" name="Slide Number Placeholder 3"/>
+          <p:cNvSpPr>
+            <a:spLocks noGrp="1"/>
+          </p:cNvSpPr>
+          <p:nvPr>
+            <p:ph type="sldNum" sz="quarter" idx="12"/>
+          </p:nvPr>
+        </p:nvSpPr>
+        <p:spPr/>
+        <p:txBody>
+          <a:bodyPr/>
+          <a:lstStyle/>
+          <a:p>
+            <a:fld id="{4FAB73BC-B049-4115-A692-8D63A059BFB8}" type="slidenum">
+              <a:rPr lang="en-US" smtClean="0"/>
+              <a:pPr/>
+              <a:t>8</a:t>
+            </a:fld>
+            <a:endParaRPr lang="en-US" dirty="0"/>
+          </a:p>
+        </p:txBody>
+      </p:sp>
+      <p:sp>
+        <p:nvSpPr>
+          <p:cNvPr id="5" name="Title 1"/>
+          <p:cNvSpPr txBox="1">
+            <a:spLocks/>
+          </p:cNvSpPr>
+          <p:nvPr/>
+        </p:nvSpPr>
+        <p:spPr>
+          <a:xfrm>
+            <a:off x="609600" y="5638801"/>
+            <a:ext cx="10972800" cy="1143000"/>
+          </a:xfrm>
+          <a:prstGeom prst="rect">
+            <a:avLst/>
+          </a:prstGeom>
+        </p:spPr>
+        <p:txBody>
+          <a:bodyPr vert="horz" anchor="ctr">
+            <a:normAutofit/>
+            <a:scene3d>
+              <a:camera prst="orthographicFront"/>
+              <a:lightRig rig="soft" dir="t">
+                <a:rot lat="0" lon="0" rev="16800000"/>
+              </a:lightRig>
+            </a:scene3d>
+            <a:sp3d prstMaterial="softEdge">
+              <a:bevelT w="38100" h="38100"/>
+            </a:sp3d>
+          </a:bodyPr>
+          <a:lstStyle/>
+          <a:p>
+            <a:pPr marL="0" marR="0" lvl="0" indent="0" algn="ctr" defTabSz="914400" rtl="0" eaLnBrk="1" fontAlgn="auto" latinLnBrk="0" hangingPunct="1">
+              <a:lnSpc>
+                <a:spcPct val="100000"/>
+              </a:lnSpc>
+              <a:spcBef>
+                <a:spcPct val="0"/>
+              </a:spcBef>
+              <a:spcAft>
+                <a:spcPts val="0"/>
+              </a:spcAft>
+              <a:buClrTx/>
+              <a:buSzTx/>
+              <a:buFontTx/>
+              <a:buNone/>
+              <a:tabLst/>
+              <a:defRPr/>
+            </a:pPr>
+            <a:r>
+              <a:rPr kumimoji="0" lang="en-IN" sz="4100" b="1" i="0" u="none" strike="noStrike" kern="1200" cap="none" spc="0" normalizeH="0" baseline="0" noProof="0" dirty="0" smtClean="0">
+                <a:ln w="6350">
+                  <a:noFill/>
+                </a:ln>
+                <a:gradFill>
+                  <a:gsLst>
+                    <a:gs pos="0">
+                      <a:schemeClr val="accent1">
+                        <a:tint val="73000"/>
+                        <a:satMod val="145000"/>
+                      </a:schemeClr>
+                    </a:gs>
+                    <a:gs pos="73000">
+                      <a:schemeClr val="accent1">
+                        <a:tint val="73000"/>
+                        <a:satMod val="145000"/>
+                      </a:schemeClr>
+                    </a:gs>
+                    <a:gs pos="100000">
+                      <a:schemeClr val="accent1">
+                        <a:tint val="83000"/>
+                        <a:satMod val="143000"/>
+                      </a:schemeClr>
+                    </a:gs>
+                  </a:gsLst>
+                  <a:lin ang="4800000" scaled="1"/>
+                </a:gradFill>
+                <a:effectLst>
+                  <a:outerShdw blurRad="114300" dist="101600" dir="2700000" algn="tl" rotWithShape="0">
+                    <a:srgbClr val="000000">
+                      <a:alpha val="40000"/>
+                    </a:srgbClr>
+                  </a:outerShdw>
+                </a:effectLst>
+                <a:uLnTx/>
+                <a:uFillTx/>
+                <a:latin typeface="+mj-lt"/>
+                <a:ea typeface="+mj-ea"/>
+                <a:cs typeface="+mj-cs"/>
+              </a:rPr>
+              <a:t>Thank You</a:t>
+            </a:r>
+            <a:endParaRPr kumimoji="0" lang="en-IN" sz="4100" b="1" i="0" u="none" strike="noStrike" kern="1200" cap="none" spc="0" normalizeH="0" baseline="0" noProof="0" dirty="0">
+              <a:ln w="6350">
+                <a:noFill/>
+              </a:ln>
+              <a:gradFill>
+                <a:gsLst>
+                  <a:gs pos="0">
+                    <a:schemeClr val="accent1">
+                      <a:tint val="73000"/>
+                      <a:satMod val="145000"/>
+                    </a:schemeClr>
+                  </a:gs>
+                  <a:gs pos="73000">
+                    <a:schemeClr val="accent1">
+                      <a:tint val="73000"/>
+                      <a:satMod val="145000"/>
+                    </a:schemeClr>
+                  </a:gs>
+                  <a:gs pos="100000">
+                    <a:schemeClr val="accent1">
+                      <a:tint val="83000"/>
+                      <a:satMod val="143000"/>
+                    </a:schemeClr>
+                  </a:gs>
+                </a:gsLst>
+                <a:lin ang="4800000" scaled="1"/>
+              </a:gradFill>
+              <a:effectLst>
+                <a:outerShdw blurRad="114300" dist="101600" dir="2700000" algn="tl" rotWithShape="0">
+                  <a:srgbClr val="000000">
+                    <a:alpha val="40000"/>
+                  </a:srgbClr>
+                </a:outerShdw>
+              </a:effectLst>
+              <a:uLnTx/>
+              <a:uFillTx/>
+              <a:latin typeface="+mj-lt"/>
+              <a:ea typeface="+mj-ea"/>
+              <a:cs typeface="+mj-cs"/>
+            </a:endParaRPr>
+          </a:p>
+        </p:txBody>
+      </p:sp>
+      <p:sp>
+        <p:nvSpPr>
+          <p:cNvPr id="6" name="Rectangle 5"/>
+          <p:cNvSpPr/>
+          <p:nvPr/>
+        </p:nvSpPr>
+        <p:spPr>
+          <a:xfrm>
+            <a:off x="360217" y="193964"/>
+            <a:ext cx="11591637" cy="4031873"/>
+          </a:xfrm>
+          <a:prstGeom prst="rect">
+            <a:avLst/>
+          </a:prstGeom>
+        </p:spPr>
+        <p:txBody>
+          <a:bodyPr wrap="square">
+            <a:spAutoFit/>
+          </a:bodyPr>
+          <a:lstStyle/>
+          <a:p>
+            <a:r>
+              <a:rPr lang="en-IN" sz="2000" b="1" dirty="0" smtClean="0">
+                <a:solidFill>
+                  <a:srgbClr val="C00000"/>
+                </a:solidFill>
+              </a:rPr>
+              <a:t>Issues Faced</a:t>
+            </a:r>
+          </a:p>
+          <a:p>
+            <a:pPr lvl="0" fontAlgn="base">
+              <a:buFont typeface="Arial" pitchFamily="34" charset="0"/>
+              <a:buChar char="•"/>
+            </a:pPr>
+            <a:r>
+              <a:rPr lang="en-IN" sz="2000" dirty="0" smtClean="0"/>
+              <a:t> Over fitting the data - Got good validation scores in training, but same performance is not repeated in competition submission.</a:t>
+            </a:r>
+          </a:p>
+          <a:p>
+            <a:pPr lvl="0" fontAlgn="base">
+              <a:buFont typeface="Arial" pitchFamily="34" charset="0"/>
+              <a:buChar char="•"/>
+            </a:pPr>
+            <a:r>
+              <a:rPr lang="en-IN" sz="2000" dirty="0" smtClean="0"/>
+              <a:t> As per the media, there is dengue outbreak reported in San Juan 2010-2012. But models are not predicted the outbreaks, but just increased the reported cases count compared to previous years.</a:t>
+            </a:r>
+          </a:p>
+          <a:p>
+            <a:pPr lvl="0" fontAlgn="base">
+              <a:buFont typeface="Arial" pitchFamily="34" charset="0"/>
+              <a:buChar char="•"/>
+            </a:pPr>
+            <a:endParaRPr lang="en-IN" dirty="0" smtClean="0"/>
+          </a:p>
+          <a:p>
+            <a:pPr lvl="0" fontAlgn="base">
+              <a:buFont typeface="Arial" pitchFamily="34" charset="0"/>
+              <a:buChar char="•"/>
+            </a:pPr>
+            <a:endParaRPr lang="en-IN" dirty="0" smtClean="0"/>
+          </a:p>
+          <a:p>
+            <a:r>
+              <a:rPr lang="en-IN" sz="2000" b="1" dirty="0" smtClean="0">
+                <a:solidFill>
+                  <a:srgbClr val="C00000"/>
+                </a:solidFill>
+              </a:rPr>
+              <a:t>Future Areas of Work</a:t>
+            </a:r>
+          </a:p>
+          <a:p>
+            <a:pPr lvl="0" fontAlgn="base">
+              <a:buFont typeface="Arial" pitchFamily="34" charset="0"/>
+              <a:buChar char="•"/>
+            </a:pPr>
+            <a:r>
+              <a:rPr lang="en-IN" sz="2000" dirty="0" smtClean="0"/>
+              <a:t>Same window period was tried for all weather features. Instead of that, it should have been tried each lag window for each variable and fine tune it. Might be this may take time, but surely it will improve the model performance.</a:t>
+            </a:r>
+          </a:p>
+          <a:p>
+            <a:pPr lvl="0" fontAlgn="base">
+              <a:buFont typeface="Arial" pitchFamily="34" charset="0"/>
+              <a:buChar char="•"/>
+            </a:pPr>
+            <a:r>
+              <a:rPr lang="en-IN" sz="2000" dirty="0" smtClean="0"/>
+              <a:t>Currently we modelled for entire city. Instead of that, if separate datasets for north, south, west and east are available for each city, more accurate prediction will come.</a:t>
+            </a:r>
+          </a:p>
+        </p:txBody>
+      </p:sp>
+    </p:spTree>
+  </p:cSld>
+  <p:clrMapOvr>
+    <a:masterClrMapping/>
+  </p:clrMapOvr>
+  <p:timing>
+    <p:tnLst>
+      <p:par>
+        <p:cTn id="1" dur="indefinite" restart="never" nodeType="tmRoot"/>
+      </p:par>
+    </p:tnLst>
+  </p:timing>
 </p:sld>
 </file>
 
@@ -10222,7 +12270,7 @@
   <a:extraClrSchemeLst/>
   <a:extLst>
     <a:ext uri="{05A4C25C-085E-4340-85A3-A5531E510DB2}">
-      <thm15:themeFamily xmlns:thm15="http://schemas.microsoft.com/office/thememl/2012/main" xmlns="" name="Office Theme" id="{62F939B6-93AF-4DB8-9C6B-D6C7DFDC589F}" vid="{4A3C46E8-61CC-4603-A589-7422A47A8E4A}"/>
+      <thm15:themeFamily xmlns="" xmlns:thm15="http://schemas.microsoft.com/office/thememl/2012/main" name="Office Theme" id="{62F939B6-93AF-4DB8-9C6B-D6C7DFDC589F}" vid="{4A3C46E8-61CC-4603-A589-7422A47A8E4A}"/>
     </a:ext>
   </a:extLst>
 </a:theme>

</xml_diff>